<commit_message>
many updates to git presentation slides
</commit_message>
<xml_diff>
--- a/01-workflow/slides_git.pptx
+++ b/01-workflow/slides_git.pptx
@@ -11,27 +11,26 @@
     <p:sldId id="259" r:id="rId5"/>
     <p:sldId id="260" r:id="rId6"/>
     <p:sldId id="261" r:id="rId7"/>
-    <p:sldId id="262" r:id="rId8"/>
-    <p:sldId id="263" r:id="rId9"/>
-    <p:sldId id="264" r:id="rId10"/>
-    <p:sldId id="265" r:id="rId11"/>
-    <p:sldId id="266" r:id="rId12"/>
-    <p:sldId id="267" r:id="rId13"/>
-    <p:sldId id="269" r:id="rId14"/>
-    <p:sldId id="270" r:id="rId15"/>
-    <p:sldId id="271" r:id="rId16"/>
-    <p:sldId id="272" r:id="rId17"/>
-    <p:sldId id="273" r:id="rId18"/>
-    <p:sldId id="274" r:id="rId19"/>
-    <p:sldId id="275" r:id="rId20"/>
-    <p:sldId id="268" r:id="rId21"/>
+    <p:sldId id="263" r:id="rId8"/>
+    <p:sldId id="264" r:id="rId9"/>
+    <p:sldId id="265" r:id="rId10"/>
+    <p:sldId id="266" r:id="rId11"/>
+    <p:sldId id="267" r:id="rId12"/>
+    <p:sldId id="269" r:id="rId13"/>
+    <p:sldId id="270" r:id="rId14"/>
+    <p:sldId id="272" r:id="rId15"/>
+    <p:sldId id="273" r:id="rId16"/>
+    <p:sldId id="274" r:id="rId17"/>
+    <p:sldId id="275" r:id="rId18"/>
+    <p:sldId id="285" r:id="rId19"/>
+    <p:sldId id="268" r:id="rId20"/>
+    <p:sldId id="276" r:id="rId21"/>
     <p:sldId id="277" r:id="rId22"/>
     <p:sldId id="278" r:id="rId23"/>
     <p:sldId id="284" r:id="rId24"/>
-    <p:sldId id="276" r:id="rId25"/>
-    <p:sldId id="282" r:id="rId26"/>
+    <p:sldId id="282" r:id="rId25"/>
+    <p:sldId id="280" r:id="rId26"/>
     <p:sldId id="281" r:id="rId27"/>
-    <p:sldId id="280" r:id="rId28"/>
   </p:sldIdLst>
   <p:sldSz cx="9144000" cy="6858000" type="screen4x3"/>
   <p:notesSz cx="6858000" cy="9144000"/>
@@ -315,7 +314,7 @@
             <a:fld id="{1D8BD707-D9CF-40AE-B4C6-C98DA3205C09}" type="datetimeFigureOut">
               <a:rPr lang="en-US" smtClean="0"/>
               <a:pPr/>
-              <a:t>7/18/2014</a:t>
+              <a:t>7/28/2014</a:t>
             </a:fld>
             <a:endParaRPr lang="en-US"/>
           </a:p>
@@ -482,7 +481,7 @@
             <a:fld id="{1D8BD707-D9CF-40AE-B4C6-C98DA3205C09}" type="datetimeFigureOut">
               <a:rPr lang="en-US" smtClean="0"/>
               <a:pPr/>
-              <a:t>7/18/2014</a:t>
+              <a:t>7/28/2014</a:t>
             </a:fld>
             <a:endParaRPr lang="en-US"/>
           </a:p>
@@ -659,7 +658,7 @@
             <a:fld id="{1D8BD707-D9CF-40AE-B4C6-C98DA3205C09}" type="datetimeFigureOut">
               <a:rPr lang="en-US" smtClean="0"/>
               <a:pPr/>
-              <a:t>7/18/2014</a:t>
+              <a:t>7/28/2014</a:t>
             </a:fld>
             <a:endParaRPr lang="en-US"/>
           </a:p>
@@ -826,7 +825,7 @@
             <a:fld id="{1D8BD707-D9CF-40AE-B4C6-C98DA3205C09}" type="datetimeFigureOut">
               <a:rPr lang="en-US" smtClean="0"/>
               <a:pPr/>
-              <a:t>7/18/2014</a:t>
+              <a:t>7/28/2014</a:t>
             </a:fld>
             <a:endParaRPr lang="en-US"/>
           </a:p>
@@ -1069,7 +1068,7 @@
             <a:fld id="{1D8BD707-D9CF-40AE-B4C6-C98DA3205C09}" type="datetimeFigureOut">
               <a:rPr lang="en-US" smtClean="0"/>
               <a:pPr/>
-              <a:t>7/18/2014</a:t>
+              <a:t>7/28/2014</a:t>
             </a:fld>
             <a:endParaRPr lang="en-US"/>
           </a:p>
@@ -1354,7 +1353,7 @@
             <a:fld id="{1D8BD707-D9CF-40AE-B4C6-C98DA3205C09}" type="datetimeFigureOut">
               <a:rPr lang="en-US" smtClean="0"/>
               <a:pPr/>
-              <a:t>7/18/2014</a:t>
+              <a:t>7/28/2014</a:t>
             </a:fld>
             <a:endParaRPr lang="en-US"/>
           </a:p>
@@ -1773,7 +1772,7 @@
             <a:fld id="{1D8BD707-D9CF-40AE-B4C6-C98DA3205C09}" type="datetimeFigureOut">
               <a:rPr lang="en-US" smtClean="0"/>
               <a:pPr/>
-              <a:t>7/18/2014</a:t>
+              <a:t>7/28/2014</a:t>
             </a:fld>
             <a:endParaRPr lang="en-US"/>
           </a:p>
@@ -1888,7 +1887,7 @@
             <a:fld id="{1D8BD707-D9CF-40AE-B4C6-C98DA3205C09}" type="datetimeFigureOut">
               <a:rPr lang="en-US" smtClean="0"/>
               <a:pPr/>
-              <a:t>7/18/2014</a:t>
+              <a:t>7/28/2014</a:t>
             </a:fld>
             <a:endParaRPr lang="en-US"/>
           </a:p>
@@ -1980,7 +1979,7 @@
             <a:fld id="{1D8BD707-D9CF-40AE-B4C6-C98DA3205C09}" type="datetimeFigureOut">
               <a:rPr lang="en-US" smtClean="0"/>
               <a:pPr/>
-              <a:t>7/18/2014</a:t>
+              <a:t>7/28/2014</a:t>
             </a:fld>
             <a:endParaRPr lang="en-US"/>
           </a:p>
@@ -2254,7 +2253,7 @@
             <a:fld id="{1D8BD707-D9CF-40AE-B4C6-C98DA3205C09}" type="datetimeFigureOut">
               <a:rPr lang="en-US" smtClean="0"/>
               <a:pPr/>
-              <a:t>7/18/2014</a:t>
+              <a:t>7/28/2014</a:t>
             </a:fld>
             <a:endParaRPr lang="en-US"/>
           </a:p>
@@ -2504,7 +2503,7 @@
             <a:fld id="{1D8BD707-D9CF-40AE-B4C6-C98DA3205C09}" type="datetimeFigureOut">
               <a:rPr lang="en-US" smtClean="0"/>
               <a:pPr/>
-              <a:t>7/18/2014</a:t>
+              <a:t>7/28/2014</a:t>
             </a:fld>
             <a:endParaRPr lang="en-US"/>
           </a:p>
@@ -2714,7 +2713,7 @@
             <a:fld id="{1D8BD707-D9CF-40AE-B4C6-C98DA3205C09}" type="datetimeFigureOut">
               <a:rPr lang="en-US" smtClean="0"/>
               <a:pPr/>
-              <a:t>7/18/2014</a:t>
+              <a:t>7/28/2014</a:t>
             </a:fld>
             <a:endParaRPr lang="en-US"/>
           </a:p>
@@ -3127,6 +3126,12 @@
               <a:rPr lang="en-US" dirty="0" smtClean="0"/>
               <a:t>By Kevin Markham</a:t>
             </a:r>
+          </a:p>
+          <a:p>
+            <a:r>
+              <a:rPr lang="en-US" dirty="0" smtClean="0"/>
+              <a:t>dataschool.io</a:t>
+            </a:r>
             <a:endParaRPr lang="en-US" dirty="0"/>
           </a:p>
         </p:txBody>
@@ -3185,7 +3190,7 @@
           <a:p>
             <a:r>
               <a:rPr lang="en-US" dirty="0" smtClean="0"/>
-              <a:t>Setup</a:t>
+              <a:t>Navigating a GitHub repo (1 of 2)</a:t>
             </a:r>
             <a:endParaRPr lang="en-US" dirty="0"/>
           </a:p>
@@ -3201,88 +3206,108 @@
             <p:ph idx="1"/>
           </p:nvPr>
         </p:nvSpPr>
-        <p:spPr/>
-        <p:txBody>
-          <a:bodyPr/>
-          <a:lstStyle/>
-          <a:p>
-            <a:r>
-              <a:rPr lang="en-US" dirty="0" smtClean="0"/>
-              <a:t>Open </a:t>
-            </a:r>
-            <a:r>
-              <a:rPr lang="en-US" dirty="0"/>
-              <a:t>Git Bash (Windows) or Terminal (Mac/Linux)</a:t>
-            </a:r>
-          </a:p>
-          <a:p>
-            <a:pPr lvl="1"/>
-            <a:r>
-              <a:rPr lang="en-US" dirty="0"/>
-              <a:t>git config --global user.name “YOUR </a:t>
-            </a:r>
-            <a:r>
-              <a:rPr lang="en-US" dirty="0" smtClean="0"/>
-              <a:t>FULL NAME</a:t>
-            </a:r>
-            <a:r>
-              <a:rPr lang="en-US" dirty="0"/>
-              <a:t>”</a:t>
-            </a:r>
-          </a:p>
-          <a:p>
-            <a:pPr lvl="1"/>
-            <a:r>
-              <a:rPr lang="en-US" dirty="0"/>
-              <a:t>git config --global user.email “YOUR EMAIL</a:t>
-            </a:r>
-            <a:r>
-              <a:rPr lang="en-US" dirty="0" smtClean="0"/>
-              <a:t>”</a:t>
-            </a:r>
-          </a:p>
-          <a:p>
-            <a:r>
-              <a:rPr lang="en-US" dirty="0" smtClean="0"/>
-              <a:t>Use the same email address you used with your GitHub account</a:t>
-            </a:r>
-          </a:p>
-          <a:p>
-            <a:r>
-              <a:rPr lang="en-US" dirty="0" smtClean="0"/>
-              <a:t>Generate </a:t>
-            </a:r>
-            <a:r>
-              <a:rPr lang="en-US" dirty="0"/>
-              <a:t>SSH keys: </a:t>
+        <p:spPr>
+          <a:xfrm>
+            <a:off x="457200" y="1600200"/>
+            <a:ext cx="8229600" cy="4800600"/>
+          </a:xfrm>
+        </p:spPr>
+        <p:txBody>
+          <a:bodyPr>
+            <a:normAutofit fontScale="92500" lnSpcReduction="10000"/>
+          </a:bodyPr>
+          <a:lstStyle/>
+          <a:p>
+            <a:r>
+              <a:rPr lang="en-US" dirty="0" smtClean="0"/>
+              <a:t>Example repo: </a:t>
             </a:r>
             <a:r>
               <a:rPr lang="en-US" dirty="0" smtClean="0">
                 <a:hlinkClick r:id="rId2"/>
               </a:rPr>
-              <a:t>tiny.cc/</a:t>
-            </a:r>
-            <a:r>
-              <a:rPr lang="en-US" dirty="0" err="1" smtClean="0">
-                <a:hlinkClick r:id="rId2"/>
-              </a:rPr>
-              <a:t>gitssh</a:t>
+              <a:t>git.io/ggplot2</a:t>
             </a:r>
             <a:endParaRPr lang="en-US" dirty="0" smtClean="0"/>
           </a:p>
           <a:p>
-            <a:pPr lvl="1"/>
-            <a:r>
-              <a:rPr lang="en-US" dirty="0" smtClean="0"/>
-              <a:t>More secure that HTTPS</a:t>
-            </a:r>
+            <a:r>
+              <a:rPr lang="en-US" dirty="0" smtClean="0"/>
+              <a:t>Account name, repo name, description</a:t>
+            </a:r>
+          </a:p>
+          <a:p>
+            <a:r>
+              <a:rPr lang="en-US" dirty="0"/>
+              <a:t>F</a:t>
+            </a:r>
+            <a:r>
+              <a:rPr lang="en-US" dirty="0" smtClean="0"/>
+              <a:t>older structure</a:t>
+            </a:r>
+          </a:p>
+          <a:p>
+            <a:r>
+              <a:rPr lang="en-US" dirty="0" smtClean="0"/>
+              <a:t>Viewing files:</a:t>
+            </a:r>
+          </a:p>
+          <a:p>
+            <a:pPr lvl="1"/>
+            <a:r>
+              <a:rPr lang="en-US" dirty="0"/>
+              <a:t>R</a:t>
+            </a:r>
+            <a:r>
+              <a:rPr lang="en-US" dirty="0" smtClean="0"/>
+              <a:t>endered view (with syntax highlighting)</a:t>
+            </a:r>
+          </a:p>
+          <a:p>
+            <a:pPr lvl="1"/>
+            <a:r>
+              <a:rPr lang="en-US" dirty="0" smtClean="0"/>
+              <a:t>Raw view</a:t>
+            </a:r>
+          </a:p>
+          <a:p>
+            <a:r>
+              <a:rPr lang="en-US" dirty="0" smtClean="0"/>
+              <a:t>README.md:</a:t>
+            </a:r>
+          </a:p>
+          <a:p>
+            <a:pPr lvl="1"/>
+            <a:r>
+              <a:rPr lang="en-US" dirty="0" smtClean="0"/>
+              <a:t>Describes a repo</a:t>
+            </a:r>
+          </a:p>
+          <a:p>
+            <a:pPr lvl="1"/>
+            <a:r>
+              <a:rPr lang="en-US" dirty="0"/>
+              <a:t>A</a:t>
+            </a:r>
+            <a:r>
+              <a:rPr lang="en-US" dirty="0" smtClean="0"/>
+              <a:t>utomatically displayed</a:t>
+            </a:r>
+          </a:p>
+          <a:p>
+            <a:pPr lvl="1"/>
+            <a:r>
+              <a:rPr lang="en-US" dirty="0" smtClean="0"/>
+              <a:t>Written in Markdown</a:t>
+            </a:r>
+            <a:endParaRPr lang="en-US" dirty="0"/>
           </a:p>
         </p:txBody>
       </p:sp>
     </p:spTree>
     <p:extLst>
       <p:ext uri="{BB962C8B-B14F-4D97-AF65-F5344CB8AC3E}">
-        <p14:creationId xmlns:p14="http://schemas.microsoft.com/office/powerpoint/2010/main" val="4097134233"/>
+        <p14:creationId xmlns:p14="http://schemas.microsoft.com/office/powerpoint/2010/main" val="996277193"/>
       </p:ext>
     </p:extLst>
   </p:cSld>
@@ -3332,10 +3357,17 @@
           <a:lstStyle/>
           <a:p>
             <a:r>
-              <a:rPr lang="en-US" dirty="0" smtClean="0"/>
-              <a:t>Navigating a GitHub repo (1 of 2)</a:t>
-            </a:r>
-            <a:endParaRPr lang="en-US" dirty="0"/>
+              <a:rPr lang="en-US" dirty="0"/>
+              <a:t>Navigating a GitHub repo </a:t>
+            </a:r>
+            <a:r>
+              <a:rPr lang="en-US" dirty="0" smtClean="0"/>
+              <a:t>(2 </a:t>
+            </a:r>
+            <a:r>
+              <a:rPr lang="en-US" dirty="0"/>
+              <a:t>of 2)</a:t>
+            </a:r>
           </a:p>
         </p:txBody>
       </p:sp>
@@ -3351,74 +3383,50 @@
         </p:nvSpPr>
         <p:spPr/>
         <p:txBody>
-          <a:bodyPr>
-            <a:normAutofit/>
-          </a:bodyPr>
-          <a:lstStyle/>
-          <a:p>
-            <a:r>
-              <a:rPr lang="en-US" dirty="0" smtClean="0"/>
-              <a:t>Example repo: </a:t>
-            </a:r>
-            <a:r>
-              <a:rPr lang="en-US" dirty="0" smtClean="0">
-                <a:hlinkClick r:id="rId2"/>
-              </a:rPr>
-              <a:t>git.io/ggplot2</a:t>
-            </a:r>
-            <a:endParaRPr lang="en-US" dirty="0" smtClean="0"/>
-          </a:p>
-          <a:p>
-            <a:r>
-              <a:rPr lang="en-US" dirty="0" smtClean="0"/>
-              <a:t>Account name, repo name, description</a:t>
-            </a:r>
-          </a:p>
-          <a:p>
+          <a:bodyPr/>
+          <a:lstStyle/>
+          <a:p>
+            <a:r>
+              <a:rPr lang="en-US" dirty="0" smtClean="0"/>
+              <a:t>Commits:</a:t>
+            </a:r>
+          </a:p>
+          <a:p>
+            <a:pPr lvl="1"/>
+            <a:r>
+              <a:rPr lang="en-US" dirty="0" smtClean="0"/>
+              <a:t>One or more changes to one or more files</a:t>
+            </a:r>
+          </a:p>
+          <a:p>
+            <a:pPr lvl="1"/>
+            <a:r>
+              <a:rPr lang="en-US" dirty="0" smtClean="0"/>
+              <a:t>Revision highlighting</a:t>
+            </a:r>
+          </a:p>
+          <a:p>
+            <a:pPr lvl="1"/>
             <a:r>
               <a:rPr lang="en-US" dirty="0"/>
-              <a:t>F</a:t>
-            </a:r>
-            <a:r>
-              <a:rPr lang="en-US" dirty="0" smtClean="0"/>
-              <a:t>older structure</a:t>
-            </a:r>
-          </a:p>
-          <a:p>
-            <a:r>
-              <a:rPr lang="en-US" dirty="0" smtClean="0"/>
-              <a:t>Viewing files</a:t>
-            </a:r>
-          </a:p>
-          <a:p>
-            <a:pPr lvl="1"/>
-            <a:r>
-              <a:rPr lang="en-US" dirty="0"/>
-              <a:t>R</a:t>
-            </a:r>
-            <a:r>
-              <a:rPr lang="en-US" dirty="0" smtClean="0"/>
-              <a:t>endered vs raw</a:t>
-            </a:r>
-          </a:p>
-          <a:p>
-            <a:pPr lvl="1"/>
-            <a:r>
-              <a:rPr lang="en-US" dirty="0" smtClean="0"/>
-              <a:t>Change history</a:t>
-            </a:r>
-          </a:p>
-          <a:p>
-            <a:r>
-              <a:rPr lang="en-US" dirty="0" smtClean="0"/>
-              <a:t>README.md</a:t>
-            </a:r>
-          </a:p>
-          <a:p>
-            <a:pPr lvl="1"/>
-            <a:r>
-              <a:rPr lang="en-US" dirty="0" smtClean="0"/>
-              <a:t>Side note: What is Markdown?</a:t>
+              <a:t>Commit comments are </a:t>
+            </a:r>
+            <a:r>
+              <a:rPr lang="en-US" dirty="0" smtClean="0"/>
+              <a:t>required</a:t>
+            </a:r>
+          </a:p>
+          <a:p>
+            <a:pPr lvl="1"/>
+            <a:r>
+              <a:rPr lang="en-US" dirty="0" smtClean="0"/>
+              <a:t>Most recent commit comment shown by filename</a:t>
+            </a:r>
+          </a:p>
+          <a:p>
+            <a:r>
+              <a:rPr lang="en-US" dirty="0" smtClean="0"/>
+              <a:t>Profile page</a:t>
             </a:r>
             <a:endParaRPr lang="en-US" dirty="0"/>
           </a:p>
@@ -3427,7 +3435,7 @@
     </p:spTree>
     <p:extLst>
       <p:ext uri="{BB962C8B-B14F-4D97-AF65-F5344CB8AC3E}">
-        <p14:creationId xmlns:p14="http://schemas.microsoft.com/office/powerpoint/2010/main" val="996277193"/>
+        <p14:creationId xmlns:p14="http://schemas.microsoft.com/office/powerpoint/2010/main" val="4083938562"/>
       </p:ext>
     </p:extLst>
   </p:cSld>
@@ -3477,17 +3485,10 @@
           <a:lstStyle/>
           <a:p>
             <a:r>
-              <a:rPr lang="en-US" dirty="0"/>
-              <a:t>Navigating a GitHub repo </a:t>
-            </a:r>
-            <a:r>
-              <a:rPr lang="en-US" dirty="0" smtClean="0"/>
-              <a:t>(2 </a:t>
-            </a:r>
-            <a:r>
-              <a:rPr lang="en-US" dirty="0"/>
-              <a:t>of 2)</a:t>
-            </a:r>
+              <a:rPr lang="en-US" dirty="0" smtClean="0"/>
+              <a:t>Creating a repo on GitHub</a:t>
+            </a:r>
+            <a:endParaRPr lang="en-US" dirty="0"/>
           </a:p>
         </p:txBody>
       </p:sp>
@@ -3508,54 +3509,41 @@
           <a:p>
             <a:r>
               <a:rPr lang="en-US" dirty="0" smtClean="0"/>
-              <a:t>Commits:</a:t>
-            </a:r>
-          </a:p>
-          <a:p>
-            <a:pPr lvl="1"/>
-            <a:r>
-              <a:rPr lang="en-US" dirty="0" smtClean="0"/>
-              <a:t>One or more changes to one or more files</a:t>
-            </a:r>
-          </a:p>
-          <a:p>
-            <a:pPr lvl="1"/>
-            <a:r>
-              <a:rPr lang="en-US" dirty="0" smtClean="0"/>
-              <a:t>Commit comments</a:t>
-            </a:r>
-          </a:p>
-          <a:p>
-            <a:pPr lvl="1"/>
-            <a:r>
-              <a:rPr lang="en-US" dirty="0" smtClean="0"/>
-              <a:t>Revision highlighting</a:t>
-            </a:r>
-          </a:p>
-          <a:p>
-            <a:r>
-              <a:rPr lang="en-US" dirty="0" smtClean="0"/>
-              <a:t>Most recent commit: comment and date</a:t>
-            </a:r>
-          </a:p>
-          <a:p>
-            <a:r>
-              <a:rPr lang="en-US" dirty="0" smtClean="0"/>
-              <a:t>Issues, </a:t>
-            </a:r>
-            <a:r>
-              <a:rPr lang="en-US" dirty="0"/>
-              <a:t>p</a:t>
-            </a:r>
-            <a:r>
-              <a:rPr lang="en-US" dirty="0" smtClean="0"/>
-              <a:t>ull requests, branches, contributors</a:t>
-            </a:r>
-          </a:p>
-          <a:p>
-            <a:r>
-              <a:rPr lang="en-US" dirty="0" smtClean="0"/>
-              <a:t>Profile page, repo list</a:t>
+              <a:t>Click “Create New” (plus sign):</a:t>
+            </a:r>
+          </a:p>
+          <a:p>
+            <a:pPr lvl="1"/>
+            <a:r>
+              <a:rPr lang="en-US" dirty="0" smtClean="0"/>
+              <a:t>Define name, description, public or private</a:t>
+            </a:r>
+          </a:p>
+          <a:p>
+            <a:pPr lvl="1"/>
+            <a:r>
+              <a:rPr lang="en-US" dirty="0" smtClean="0"/>
+              <a:t>Initialize with README (if you’re going to clone)</a:t>
+            </a:r>
+          </a:p>
+          <a:p>
+            <a:r>
+              <a:rPr lang="en-US" dirty="0" smtClean="0"/>
+              <a:t>Notes:</a:t>
+            </a:r>
+          </a:p>
+          <a:p>
+            <a:pPr lvl="1"/>
+            <a:r>
+              <a:rPr lang="en-US" dirty="0" smtClean="0"/>
+              <a:t>Nothing has happened to your local computer</a:t>
+            </a:r>
+          </a:p>
+          <a:p>
+            <a:pPr lvl="1"/>
+            <a:r>
+              <a:rPr lang="en-US" dirty="0" smtClean="0"/>
+              <a:t>This was done on GitHub, but GitHub used Git to add the README.md file</a:t>
             </a:r>
             <a:endParaRPr lang="en-US" dirty="0"/>
           </a:p>
@@ -3564,7 +3552,7 @@
     </p:spTree>
     <p:extLst>
       <p:ext uri="{BB962C8B-B14F-4D97-AF65-F5344CB8AC3E}">
-        <p14:creationId xmlns:p14="http://schemas.microsoft.com/office/powerpoint/2010/main" val="4083938562"/>
+        <p14:creationId xmlns:p14="http://schemas.microsoft.com/office/powerpoint/2010/main" val="2217687155"/>
       </p:ext>
     </p:extLst>
   </p:cSld>
@@ -3615,7 +3603,7 @@
           <a:p>
             <a:r>
               <a:rPr lang="en-US" dirty="0" smtClean="0"/>
-              <a:t>Creating a repo on GitHub</a:t>
+              <a:t>Cloning a GitHub repo</a:t>
             </a:r>
             <a:endParaRPr lang="en-US" dirty="0"/>
           </a:p>
@@ -3633,62 +3621,108 @@
         </p:nvSpPr>
         <p:spPr/>
         <p:txBody>
-          <a:bodyPr/>
-          <a:lstStyle/>
-          <a:p>
-            <a:r>
-              <a:rPr lang="en-US" dirty="0" smtClean="0"/>
-              <a:t>Creating a repo:</a:t>
-            </a:r>
-          </a:p>
-          <a:p>
-            <a:pPr lvl="1"/>
-            <a:r>
-              <a:rPr lang="en-US" dirty="0" smtClean="0"/>
-              <a:t>Name, description, public/private</a:t>
-            </a:r>
-          </a:p>
-          <a:p>
-            <a:pPr lvl="1"/>
-            <a:r>
-              <a:rPr lang="en-US" dirty="0" smtClean="0"/>
-              <a:t>Initialize with README (if you’re going to clone)</a:t>
-            </a:r>
-          </a:p>
-          <a:p>
-            <a:pPr lvl="1"/>
-            <a:r>
-              <a:rPr lang="en-US" dirty="0" smtClean="0"/>
-              <a:t>Do it!</a:t>
-            </a:r>
-          </a:p>
-          <a:p>
-            <a:r>
-              <a:rPr lang="en-US" dirty="0" smtClean="0"/>
-              <a:t>Notes:</a:t>
-            </a:r>
-          </a:p>
-          <a:p>
-            <a:pPr lvl="1"/>
-            <a:r>
-              <a:rPr lang="en-US" dirty="0" smtClean="0"/>
-              <a:t>Nothing has happened to your local computer</a:t>
-            </a:r>
-          </a:p>
-          <a:p>
-            <a:pPr lvl="1"/>
-            <a:r>
-              <a:rPr lang="en-US" dirty="0" smtClean="0"/>
-              <a:t>This was done on GitHub, but GitHub used Git to add the README.md file</a:t>
-            </a:r>
-            <a:endParaRPr lang="en-US" dirty="0"/>
+          <a:bodyPr>
+            <a:normAutofit fontScale="92500" lnSpcReduction="10000"/>
+          </a:bodyPr>
+          <a:lstStyle/>
+          <a:p>
+            <a:r>
+              <a:rPr lang="en-US" dirty="0" smtClean="0"/>
+              <a:t>Cloning = copying to your local computer</a:t>
+            </a:r>
+          </a:p>
+          <a:p>
+            <a:pPr lvl="1"/>
+            <a:r>
+              <a:rPr lang="en-US" dirty="0" smtClean="0"/>
+              <a:t>Like copying your Dropbox files to a new machine</a:t>
+            </a:r>
+          </a:p>
+          <a:p>
+            <a:r>
+              <a:rPr lang="en-US" dirty="0" smtClean="0"/>
+              <a:t>First, change your working directory to where you want the repo to be stored: </a:t>
+            </a:r>
+            <a:r>
+              <a:rPr lang="en-US" dirty="0" smtClean="0">
+                <a:solidFill>
+                  <a:srgbClr val="C00000"/>
+                </a:solidFill>
+              </a:rPr>
+              <a:t>cd</a:t>
+            </a:r>
+          </a:p>
+          <a:p>
+            <a:r>
+              <a:rPr lang="en-US" dirty="0" smtClean="0"/>
+              <a:t>Then, clone the repo: </a:t>
+            </a:r>
+            <a:r>
+              <a:rPr lang="en-US" dirty="0" smtClean="0">
+                <a:solidFill>
+                  <a:srgbClr val="C00000"/>
+                </a:solidFill>
+              </a:rPr>
+              <a:t>git clone &lt;URL&gt;</a:t>
+            </a:r>
+          </a:p>
+          <a:p>
+            <a:pPr lvl="1"/>
+            <a:r>
+              <a:rPr lang="en-US" dirty="0" smtClean="0"/>
+              <a:t>Get SSH or HTTPS URL from GitHub (ends in .git)</a:t>
+            </a:r>
+          </a:p>
+          <a:p>
+            <a:pPr lvl="1"/>
+            <a:r>
+              <a:rPr lang="en-US" dirty="0" smtClean="0"/>
+              <a:t>Clones to a subdirectory of the working directory</a:t>
+            </a:r>
+          </a:p>
+          <a:p>
+            <a:pPr lvl="1"/>
+            <a:r>
+              <a:rPr lang="en-US" dirty="0" smtClean="0"/>
+              <a:t>No visual feedback when you type your password</a:t>
+            </a:r>
+          </a:p>
+          <a:p>
+            <a:r>
+              <a:rPr lang="en-US" dirty="0" smtClean="0"/>
+              <a:t>Navigate to the repo (</a:t>
+            </a:r>
+            <a:r>
+              <a:rPr lang="en-US" dirty="0" smtClean="0">
+                <a:solidFill>
+                  <a:srgbClr val="C00000"/>
+                </a:solidFill>
+              </a:rPr>
+              <a:t>cd</a:t>
+            </a:r>
+            <a:r>
+              <a:rPr lang="en-US" dirty="0" smtClean="0"/>
+              <a:t>) then list the files (</a:t>
+            </a:r>
+            <a:r>
+              <a:rPr lang="en-US" dirty="0" smtClean="0">
+                <a:solidFill>
+                  <a:srgbClr val="C00000"/>
+                </a:solidFill>
+              </a:rPr>
+              <a:t>ls</a:t>
+            </a:r>
+            <a:r>
+              <a:rPr lang="en-US" dirty="0" smtClean="0"/>
+              <a:t>)</a:t>
+            </a:r>
           </a:p>
         </p:txBody>
       </p:sp>
     </p:spTree>
     <p:extLst>
       <p:ext uri="{BB962C8B-B14F-4D97-AF65-F5344CB8AC3E}">
-        <p14:creationId xmlns:p14="http://schemas.microsoft.com/office/powerpoint/2010/main" val="2217687155"/>
+        <p14:creationId xmlns:p14="http://schemas.microsoft.com/office/powerpoint/2010/main" val="1504453294"/>
       </p:ext>
     </p:extLst>
   </p:cSld>
@@ -3739,7 +3773,7 @@
           <a:p>
             <a:r>
               <a:rPr lang="en-US" dirty="0" smtClean="0"/>
-              <a:t>Cloning a GitHub repo</a:t>
+              <a:t>Checking your remotes</a:t>
             </a:r>
             <a:endParaRPr lang="en-US" dirty="0"/>
           </a:p>
@@ -3757,73 +3791,47 @@
         </p:nvSpPr>
         <p:spPr/>
         <p:txBody>
-          <a:bodyPr>
-            <a:normAutofit/>
-          </a:bodyPr>
-          <a:lstStyle/>
-          <a:p>
-            <a:r>
-              <a:rPr lang="en-US" dirty="0" smtClean="0"/>
-              <a:t>Cloning a repo:</a:t>
-            </a:r>
-          </a:p>
-          <a:p>
-            <a:pPr lvl="1"/>
-            <a:r>
-              <a:rPr lang="en-US" dirty="0" smtClean="0"/>
-              <a:t>Copies it to your local computer</a:t>
-            </a:r>
-          </a:p>
-          <a:p>
-            <a:r>
-              <a:rPr lang="en-US" dirty="0" smtClean="0"/>
-              <a:t>Commands:</a:t>
-            </a:r>
-          </a:p>
-          <a:p>
-            <a:pPr lvl="1"/>
-            <a:r>
-              <a:rPr lang="en-US" dirty="0" smtClean="0"/>
-              <a:t>Change your working directory: cd</a:t>
-            </a:r>
-          </a:p>
-          <a:p>
-            <a:pPr lvl="1"/>
-            <a:r>
-              <a:rPr lang="en-US" dirty="0" smtClean="0"/>
-              <a:t>Clone: git clone &lt;URL&gt;</a:t>
-            </a:r>
-          </a:p>
-          <a:p>
-            <a:r>
-              <a:rPr lang="en-US" dirty="0" smtClean="0"/>
-              <a:t>Notes:</a:t>
-            </a:r>
-          </a:p>
-          <a:p>
-            <a:pPr lvl="1"/>
-            <a:r>
-              <a:rPr lang="en-US" dirty="0" smtClean="0"/>
-              <a:t>Copy SSH or HTTPS URL from GitHub (ends in .git)</a:t>
-            </a:r>
-          </a:p>
-          <a:p>
-            <a:pPr lvl="1"/>
-            <a:r>
-              <a:rPr lang="en-US" dirty="0" smtClean="0"/>
-              <a:t>No visual feedback when you type your password</a:t>
-            </a:r>
-          </a:p>
-          <a:p>
-            <a:pPr lvl="1"/>
-            <a:endParaRPr lang="en-US" dirty="0"/>
+          <a:bodyPr/>
+          <a:lstStyle/>
+          <a:p>
+            <a:r>
+              <a:rPr lang="en-US" dirty="0" smtClean="0"/>
+              <a:t>A “remote alias” is a reference to a repo not on your local computer</a:t>
+            </a:r>
+          </a:p>
+          <a:p>
+            <a:pPr lvl="1"/>
+            <a:r>
+              <a:rPr lang="en-US" dirty="0" smtClean="0"/>
+              <a:t>Like a connection to your Dropbox account</a:t>
+            </a:r>
+          </a:p>
+          <a:p>
+            <a:r>
+              <a:rPr lang="en-US" dirty="0" smtClean="0"/>
+              <a:t>“origin” remote was set up by “git clone”</a:t>
+            </a:r>
+          </a:p>
+          <a:p>
+            <a:r>
+              <a:rPr lang="en-US" dirty="0" smtClean="0"/>
+              <a:t>View remotes: </a:t>
+            </a:r>
+            <a:r>
+              <a:rPr lang="en-US" dirty="0" smtClean="0">
+                <a:solidFill>
+                  <a:srgbClr val="C00000"/>
+                </a:solidFill>
+              </a:rPr>
+              <a:t>git remote -v</a:t>
+            </a:r>
           </a:p>
         </p:txBody>
       </p:sp>
     </p:spTree>
     <p:extLst>
       <p:ext uri="{BB962C8B-B14F-4D97-AF65-F5344CB8AC3E}">
-        <p14:creationId xmlns:p14="http://schemas.microsoft.com/office/powerpoint/2010/main" val="1504453294"/>
+        <p14:creationId xmlns:p14="http://schemas.microsoft.com/office/powerpoint/2010/main" val="3828473833"/>
       </p:ext>
     </p:extLst>
   </p:cSld>
@@ -3869,12 +3877,14 @@
         </p:nvSpPr>
         <p:spPr/>
         <p:txBody>
-          <a:bodyPr/>
-          <a:lstStyle/>
-          <a:p>
-            <a:r>
-              <a:rPr lang="en-US" dirty="0" smtClean="0"/>
-              <a:t>Examining your cloned repo</a:t>
+          <a:bodyPr>
+            <a:normAutofit fontScale="90000"/>
+          </a:bodyPr>
+          <a:lstStyle/>
+          <a:p>
+            <a:r>
+              <a:rPr lang="en-US" dirty="0" smtClean="0"/>
+              <a:t>Making changes, checking your status</a:t>
             </a:r>
             <a:endParaRPr lang="en-US" dirty="0"/>
           </a:p>
@@ -3892,61 +3902,103 @@
         </p:nvSpPr>
         <p:spPr/>
         <p:txBody>
-          <a:bodyPr/>
-          <a:lstStyle/>
-          <a:p>
-            <a:r>
-              <a:rPr lang="en-US" dirty="0" smtClean="0"/>
-              <a:t>Cloned repo is a subdirectory of your working directory (with the same name as the repo)</a:t>
-            </a:r>
-          </a:p>
-          <a:p>
-            <a:pPr lvl="1"/>
-            <a:r>
-              <a:rPr lang="en-US" dirty="0" smtClean="0"/>
-              <a:t>Navigate to the repo (cd) then list files (ls)</a:t>
-            </a:r>
-          </a:p>
-          <a:p>
-            <a:r>
-              <a:rPr lang="en-US" dirty="0" smtClean="0"/>
-              <a:t>Branch name is shown:</a:t>
-            </a:r>
-          </a:p>
-          <a:p>
-            <a:pPr lvl="1"/>
-            <a:r>
-              <a:rPr lang="en-US" dirty="0" smtClean="0"/>
-              <a:t>Folder is being tracked by Git</a:t>
-            </a:r>
-          </a:p>
-          <a:p>
-            <a:pPr lvl="1"/>
-            <a:r>
-              <a:rPr lang="en-US" dirty="0" smtClean="0"/>
-              <a:t>Working on master branch</a:t>
-            </a:r>
-          </a:p>
-          <a:p>
-            <a:pPr lvl="1"/>
-            <a:r>
-              <a:rPr lang="en-US" dirty="0" smtClean="0"/>
-              <a:t>No need to initialize Git</a:t>
-            </a:r>
-          </a:p>
-          <a:p>
-            <a:r>
-              <a:rPr lang="en-US" dirty="0" smtClean="0"/>
-              <a:t>Everything is managed by “.git” folder</a:t>
-            </a:r>
-            <a:endParaRPr lang="en-US" dirty="0"/>
+          <a:bodyPr>
+            <a:normAutofit fontScale="92500" lnSpcReduction="20000"/>
+          </a:bodyPr>
+          <a:lstStyle/>
+          <a:p>
+            <a:r>
+              <a:rPr lang="en-US" dirty="0" smtClean="0"/>
+              <a:t>Making changes:</a:t>
+            </a:r>
+          </a:p>
+          <a:p>
+            <a:pPr lvl="1"/>
+            <a:r>
+              <a:rPr lang="en-US" dirty="0" smtClean="0"/>
+              <a:t>Modify README.md in any text editor</a:t>
+            </a:r>
+          </a:p>
+          <a:p>
+            <a:pPr lvl="1"/>
+            <a:r>
+              <a:rPr lang="en-US" dirty="0" smtClean="0"/>
+              <a:t>Create a new file: </a:t>
+            </a:r>
+            <a:r>
+              <a:rPr lang="en-US" dirty="0" smtClean="0">
+                <a:solidFill>
+                  <a:srgbClr val="C00000"/>
+                </a:solidFill>
+              </a:rPr>
+              <a:t>touch &lt;filename&gt;</a:t>
+            </a:r>
+          </a:p>
+          <a:p>
+            <a:r>
+              <a:rPr lang="en-US" dirty="0" smtClean="0"/>
+              <a:t>Check your status:</a:t>
+            </a:r>
+          </a:p>
+          <a:p>
+            <a:pPr lvl="1"/>
+            <a:r>
+              <a:rPr lang="en-US" dirty="0" smtClean="0"/>
+              <a:t> </a:t>
+            </a:r>
+            <a:r>
+              <a:rPr lang="en-US" dirty="0" smtClean="0">
+                <a:solidFill>
+                  <a:srgbClr val="C00000"/>
+                </a:solidFill>
+              </a:rPr>
+              <a:t>git status</a:t>
+            </a:r>
+          </a:p>
+          <a:p>
+            <a:r>
+              <a:rPr lang="en-US" dirty="0" smtClean="0"/>
+              <a:t>File statuses (possibly color-coded):</a:t>
+            </a:r>
+          </a:p>
+          <a:p>
+            <a:pPr lvl="1"/>
+            <a:r>
+              <a:rPr lang="en-US" dirty="0" smtClean="0"/>
+              <a:t>Untracked (red)</a:t>
+            </a:r>
+          </a:p>
+          <a:p>
+            <a:pPr lvl="1"/>
+            <a:r>
+              <a:rPr lang="en-US" dirty="0" smtClean="0"/>
+              <a:t>Tracked and modified (red)</a:t>
+            </a:r>
+          </a:p>
+          <a:p>
+            <a:pPr lvl="1"/>
+            <a:r>
+              <a:rPr lang="en-US" dirty="0"/>
+              <a:t>S</a:t>
+            </a:r>
+            <a:r>
+              <a:rPr lang="en-US" dirty="0" smtClean="0"/>
+              <a:t>taged for committing (green)</a:t>
+            </a:r>
+          </a:p>
+          <a:p>
+            <a:pPr lvl="1"/>
+            <a:r>
+              <a:rPr lang="en-US" dirty="0" smtClean="0"/>
+              <a:t>Committed</a:t>
+            </a:r>
           </a:p>
         </p:txBody>
       </p:sp>
     </p:spTree>
     <p:extLst>
       <p:ext uri="{BB962C8B-B14F-4D97-AF65-F5344CB8AC3E}">
-        <p14:creationId xmlns:p14="http://schemas.microsoft.com/office/powerpoint/2010/main" val="4290881891"/>
+        <p14:creationId xmlns:p14="http://schemas.microsoft.com/office/powerpoint/2010/main" val="3431436500"/>
       </p:ext>
     </p:extLst>
   </p:cSld>
@@ -3996,8 +4048,12 @@
           <a:lstStyle/>
           <a:p>
             <a:r>
-              <a:rPr lang="en-US" dirty="0" smtClean="0"/>
-              <a:t>Check your remotes</a:t>
+              <a:rPr lang="en-US" dirty="0"/>
+              <a:t>Committing </a:t>
+            </a:r>
+            <a:r>
+              <a:rPr lang="en-US" dirty="0" smtClean="0"/>
+              <a:t>changes</a:t>
             </a:r>
             <a:endParaRPr lang="en-US" dirty="0"/>
           </a:p>
@@ -4015,39 +4071,111 @@
         </p:nvSpPr>
         <p:spPr/>
         <p:txBody>
-          <a:bodyPr/>
-          <a:lstStyle/>
-          <a:p>
-            <a:r>
-              <a:rPr lang="en-US" dirty="0" smtClean="0"/>
-              <a:t>A “remote alias” is a reference to a repo not on your local computer</a:t>
-            </a:r>
-          </a:p>
-          <a:p>
-            <a:r>
-              <a:rPr lang="en-US" dirty="0" smtClean="0"/>
-              <a:t>“origin” remote was set up by “git clone”</a:t>
-            </a:r>
-          </a:p>
-          <a:p>
-            <a:r>
-              <a:rPr lang="en-US" dirty="0" smtClean="0"/>
-              <a:t>View remotes: git remote -v</a:t>
-            </a:r>
-          </a:p>
-          <a:p>
-            <a:r>
-              <a:rPr lang="en-US" dirty="0" smtClean="0"/>
-              <a:t>Add remote: git remote add &lt;alias&gt; &lt;URL&gt;</a:t>
-            </a:r>
-            <a:endParaRPr lang="en-US" dirty="0"/>
+          <a:bodyPr>
+            <a:normAutofit fontScale="92500" lnSpcReduction="10000"/>
+          </a:bodyPr>
+          <a:lstStyle/>
+          <a:p>
+            <a:r>
+              <a:rPr lang="en-US" dirty="0" smtClean="0"/>
+              <a:t>Stage changes for committing:</a:t>
+            </a:r>
+          </a:p>
+          <a:p>
+            <a:pPr lvl="1"/>
+            <a:r>
+              <a:rPr lang="en-US" dirty="0" smtClean="0"/>
+              <a:t>Add a single file: </a:t>
+            </a:r>
+            <a:r>
+              <a:rPr lang="en-US" dirty="0" smtClean="0">
+                <a:solidFill>
+                  <a:srgbClr val="C00000"/>
+                </a:solidFill>
+              </a:rPr>
+              <a:t>git add &lt;filename&gt;</a:t>
+            </a:r>
+          </a:p>
+          <a:p>
+            <a:pPr lvl="1"/>
+            <a:r>
+              <a:rPr lang="en-US" dirty="0" smtClean="0"/>
+              <a:t>Add all “red” files: </a:t>
+            </a:r>
+            <a:r>
+              <a:rPr lang="en-US" dirty="0" smtClean="0">
+                <a:solidFill>
+                  <a:srgbClr val="C00000"/>
+                </a:solidFill>
+              </a:rPr>
+              <a:t>git add .</a:t>
+            </a:r>
+          </a:p>
+          <a:p>
+            <a:r>
+              <a:rPr lang="en-US" dirty="0" smtClean="0"/>
+              <a:t>Check your status:</a:t>
+            </a:r>
+          </a:p>
+          <a:p>
+            <a:pPr lvl="1"/>
+            <a:r>
+              <a:rPr lang="en-US" dirty="0" smtClean="0"/>
+              <a:t>Red files have turned green</a:t>
+            </a:r>
+          </a:p>
+          <a:p>
+            <a:r>
+              <a:rPr lang="en-US" dirty="0" smtClean="0"/>
+              <a:t>Commit changes:</a:t>
+            </a:r>
+          </a:p>
+          <a:p>
+            <a:pPr lvl="1"/>
+            <a:r>
+              <a:rPr lang="en-US" dirty="0" smtClean="0"/>
+              <a:t> </a:t>
+            </a:r>
+            <a:r>
+              <a:rPr lang="en-US" dirty="0" smtClean="0">
+                <a:solidFill>
+                  <a:srgbClr val="C00000"/>
+                </a:solidFill>
+              </a:rPr>
+              <a:t>git commit -m “message about commit”</a:t>
+            </a:r>
+          </a:p>
+          <a:p>
+            <a:r>
+              <a:rPr lang="en-US" dirty="0" smtClean="0"/>
+              <a:t>Check your status again!</a:t>
+            </a:r>
+          </a:p>
+          <a:p>
+            <a:r>
+              <a:rPr lang="en-US" dirty="0" smtClean="0"/>
+              <a:t>Check the log: </a:t>
+            </a:r>
+            <a:r>
+              <a:rPr lang="en-US" dirty="0" smtClean="0">
+                <a:solidFill>
+                  <a:srgbClr val="C00000"/>
+                </a:solidFill>
+              </a:rPr>
+              <a:t>git log</a:t>
+            </a:r>
+            <a:endParaRPr lang="en-US" dirty="0">
+              <a:solidFill>
+                <a:srgbClr val="C00000"/>
+              </a:solidFill>
+            </a:endParaRPr>
           </a:p>
         </p:txBody>
       </p:sp>
     </p:spTree>
     <p:extLst>
       <p:ext uri="{BB962C8B-B14F-4D97-AF65-F5344CB8AC3E}">
-        <p14:creationId xmlns:p14="http://schemas.microsoft.com/office/powerpoint/2010/main" val="3828473833"/>
+        <p14:creationId xmlns:p14="http://schemas.microsoft.com/office/powerpoint/2010/main" val="3199936325"/>
       </p:ext>
     </p:extLst>
   </p:cSld>
@@ -4093,112 +4221,101 @@
         </p:nvSpPr>
         <p:spPr/>
         <p:txBody>
+          <a:bodyPr/>
+          <a:lstStyle/>
+          <a:p>
+            <a:r>
+              <a:rPr lang="en-US" dirty="0" smtClean="0"/>
+              <a:t>Pushing to GitHub</a:t>
+            </a:r>
+            <a:endParaRPr lang="en-US" dirty="0"/>
+          </a:p>
+        </p:txBody>
+      </p:sp>
+      <p:sp>
+        <p:nvSpPr>
+          <p:cNvPr id="3" name="Content Placeholder 2"/>
+          <p:cNvSpPr>
+            <a:spLocks noGrp="1"/>
+          </p:cNvSpPr>
+          <p:nvPr>
+            <p:ph idx="1"/>
+          </p:nvPr>
+        </p:nvSpPr>
+        <p:spPr/>
+        <p:txBody>
           <a:bodyPr>
-            <a:normAutofit fontScale="90000"/>
+            <a:normAutofit/>
           </a:bodyPr>
           <a:lstStyle/>
           <a:p>
             <a:r>
               <a:rPr lang="en-US" dirty="0" smtClean="0"/>
-              <a:t>Making changes, checking your status</a:t>
+              <a:t>Everything you’ve done to your cloned repo (so far) has been local</a:t>
+            </a:r>
+          </a:p>
+          <a:p>
+            <a:r>
+              <a:rPr lang="en-US" dirty="0" smtClean="0"/>
+              <a:t>You’ve been working in the “master” branch</a:t>
+            </a:r>
+          </a:p>
+          <a:p>
+            <a:r>
+              <a:rPr lang="en-US" dirty="0" smtClean="0"/>
+              <a:t>Push committed changes to GitHub:</a:t>
+            </a:r>
+          </a:p>
+          <a:p>
+            <a:pPr lvl="1"/>
+            <a:r>
+              <a:rPr lang="en-US" dirty="0" smtClean="0"/>
+              <a:t>Like syncing local file changes to Dropbox</a:t>
+            </a:r>
+          </a:p>
+          <a:p>
+            <a:pPr lvl="1"/>
+            <a:r>
+              <a:rPr lang="en-US" dirty="0" smtClean="0"/>
+              <a:t> </a:t>
+            </a:r>
+            <a:r>
+              <a:rPr lang="en-US" dirty="0" smtClean="0">
+                <a:solidFill>
+                  <a:srgbClr val="C00000"/>
+                </a:solidFill>
+              </a:rPr>
+              <a:t>git push &lt;remote&gt; &lt;branch&gt;</a:t>
+            </a:r>
+          </a:p>
+          <a:p>
+            <a:pPr lvl="1"/>
+            <a:r>
+              <a:rPr lang="en-US" dirty="0" smtClean="0"/>
+              <a:t>Often: </a:t>
+            </a:r>
+            <a:r>
+              <a:rPr lang="en-US" dirty="0" smtClean="0">
+                <a:solidFill>
+                  <a:srgbClr val="C00000"/>
+                </a:solidFill>
+              </a:rPr>
+              <a:t>git push origin master</a:t>
+            </a:r>
+          </a:p>
+          <a:p>
+            <a:r>
+              <a:rPr lang="en-US" dirty="0" smtClean="0"/>
+              <a:t>Refresh your GitHub repo to check!</a:t>
             </a:r>
             <a:endParaRPr lang="en-US" dirty="0"/>
-          </a:p>
-        </p:txBody>
-      </p:sp>
-      <p:sp>
-        <p:nvSpPr>
-          <p:cNvPr id="3" name="Content Placeholder 2"/>
-          <p:cNvSpPr>
-            <a:spLocks noGrp="1"/>
-          </p:cNvSpPr>
-          <p:nvPr>
-            <p:ph idx="1"/>
-          </p:nvPr>
-        </p:nvSpPr>
-        <p:spPr/>
-        <p:txBody>
-          <a:bodyPr>
-            <a:normAutofit fontScale="92500" lnSpcReduction="20000"/>
-          </a:bodyPr>
-          <a:lstStyle/>
-          <a:p>
-            <a:r>
-              <a:rPr lang="en-US" dirty="0" smtClean="0"/>
-              <a:t>Making changes</a:t>
-            </a:r>
-          </a:p>
-          <a:p>
-            <a:pPr lvl="1"/>
-            <a:r>
-              <a:rPr lang="en-US" dirty="0" smtClean="0"/>
-              <a:t>Modify README.md</a:t>
-            </a:r>
-          </a:p>
-          <a:p>
-            <a:pPr lvl="1"/>
-            <a:r>
-              <a:rPr lang="en-US" dirty="0" smtClean="0"/>
-              <a:t>Create new file with “touch” (not a Git command)</a:t>
-            </a:r>
-          </a:p>
-          <a:p>
-            <a:r>
-              <a:rPr lang="en-US" dirty="0" smtClean="0"/>
-              <a:t>Check your status</a:t>
-            </a:r>
-          </a:p>
-          <a:p>
-            <a:pPr lvl="1"/>
-            <a:r>
-              <a:rPr lang="en-US" dirty="0" smtClean="0"/>
-              <a:t>git status</a:t>
-            </a:r>
-          </a:p>
-          <a:p>
-            <a:r>
-              <a:rPr lang="en-US" dirty="0" smtClean="0"/>
-              <a:t>Possible file statuses:</a:t>
-            </a:r>
-          </a:p>
-          <a:p>
-            <a:pPr lvl="1"/>
-            <a:r>
-              <a:rPr lang="en-US" dirty="0" smtClean="0"/>
-              <a:t>Untracked (red)</a:t>
-            </a:r>
-          </a:p>
-          <a:p>
-            <a:pPr lvl="1"/>
-            <a:r>
-              <a:rPr lang="en-US" dirty="0" smtClean="0"/>
-              <a:t>Tracked and modified (red)</a:t>
-            </a:r>
-          </a:p>
-          <a:p>
-            <a:pPr lvl="1"/>
-            <a:r>
-              <a:rPr lang="en-US" dirty="0"/>
-              <a:t>S</a:t>
-            </a:r>
-            <a:r>
-              <a:rPr lang="en-US" dirty="0" smtClean="0"/>
-              <a:t>taged for committing (green)</a:t>
-            </a:r>
-          </a:p>
-          <a:p>
-            <a:pPr lvl="1"/>
-            <a:r>
-              <a:rPr lang="en-US" dirty="0" smtClean="0"/>
-              <a:t>Committed</a:t>
-            </a:r>
           </a:p>
         </p:txBody>
       </p:sp>
     </p:spTree>
     <p:extLst>
       <p:ext uri="{BB962C8B-B14F-4D97-AF65-F5344CB8AC3E}">
-        <p14:creationId xmlns:p14="http://schemas.microsoft.com/office/powerpoint/2010/main" val="3431436500"/>
+        <p14:creationId xmlns:p14="http://schemas.microsoft.com/office/powerpoint/2010/main" val="963782855"/>
       </p:ext>
     </p:extLst>
   </p:cSld>
@@ -4248,12 +4365,8 @@
           <a:lstStyle/>
           <a:p>
             <a:r>
-              <a:rPr lang="en-US" dirty="0"/>
-              <a:t>Committing </a:t>
-            </a:r>
-            <a:r>
-              <a:rPr lang="en-US" dirty="0" smtClean="0"/>
-              <a:t>changes</a:t>
+              <a:rPr lang="en-US" dirty="0" smtClean="0"/>
+              <a:t>Quick recap of what you’ve done</a:t>
             </a:r>
             <a:endParaRPr lang="en-US" dirty="0"/>
           </a:p>
@@ -4278,59 +4391,134 @@
           <a:p>
             <a:r>
               <a:rPr lang="en-US" dirty="0" smtClean="0"/>
-              <a:t>Stage changes for committing:</a:t>
-            </a:r>
-          </a:p>
-          <a:p>
-            <a:pPr lvl="1"/>
-            <a:r>
-              <a:rPr lang="en-US" dirty="0" smtClean="0"/>
-              <a:t>Add single file: git add &lt;filename&gt;</a:t>
-            </a:r>
-          </a:p>
-          <a:p>
-            <a:pPr lvl="1"/>
-            <a:r>
-              <a:rPr lang="en-US" dirty="0" smtClean="0"/>
-              <a:t>Add all “red” files: git add .</a:t>
-            </a:r>
-          </a:p>
-          <a:p>
-            <a:r>
-              <a:rPr lang="en-US" dirty="0" smtClean="0"/>
-              <a:t>Check your status</a:t>
-            </a:r>
-          </a:p>
-          <a:p>
-            <a:pPr lvl="1"/>
-            <a:r>
-              <a:rPr lang="en-US" dirty="0" smtClean="0"/>
-              <a:t>Red files have turned green</a:t>
-            </a:r>
-          </a:p>
-          <a:p>
-            <a:r>
-              <a:rPr lang="en-US" dirty="0" smtClean="0"/>
-              <a:t>Commit changes:</a:t>
-            </a:r>
-          </a:p>
-          <a:p>
-            <a:pPr lvl="1"/>
-            <a:r>
-              <a:rPr lang="en-US" dirty="0" smtClean="0"/>
-              <a:t>git commit -m “message about commit”</a:t>
-            </a:r>
-          </a:p>
-          <a:p>
-            <a:r>
-              <a:rPr lang="en-US" dirty="0" smtClean="0"/>
-              <a:t>Check your status again!</a:t>
-            </a:r>
-          </a:p>
-          <a:p>
-            <a:r>
-              <a:rPr lang="en-US" dirty="0" smtClean="0"/>
-              <a:t>Check the log: git log</a:t>
+              <a:t>Created a repo on GitHub</a:t>
+            </a:r>
+          </a:p>
+          <a:p>
+            <a:r>
+              <a:rPr lang="en-US" dirty="0" smtClean="0"/>
+              <a:t>Cloned repo to your local computer (</a:t>
+            </a:r>
+            <a:r>
+              <a:rPr lang="en-US" dirty="0" smtClean="0">
+                <a:solidFill>
+                  <a:srgbClr val="C00000"/>
+                </a:solidFill>
+              </a:rPr>
+              <a:t>git clone</a:t>
+            </a:r>
+            <a:r>
+              <a:rPr lang="en-US" dirty="0" smtClean="0"/>
+              <a:t>)</a:t>
+            </a:r>
+          </a:p>
+          <a:p>
+            <a:pPr lvl="1"/>
+            <a:r>
+              <a:rPr lang="en-US" dirty="0" smtClean="0"/>
+              <a:t>Automatically set up your “origin” remote</a:t>
+            </a:r>
+          </a:p>
+          <a:p>
+            <a:r>
+              <a:rPr lang="en-US" dirty="0" smtClean="0"/>
+              <a:t>Made two file changes</a:t>
+            </a:r>
+          </a:p>
+          <a:p>
+            <a:r>
+              <a:rPr lang="en-US" dirty="0" smtClean="0"/>
+              <a:t>Staged changes for committing (</a:t>
+            </a:r>
+            <a:r>
+              <a:rPr lang="en-US" dirty="0" smtClean="0">
+                <a:solidFill>
+                  <a:srgbClr val="C00000"/>
+                </a:solidFill>
+              </a:rPr>
+              <a:t>git add</a:t>
+            </a:r>
+            <a:r>
+              <a:rPr lang="en-US" dirty="0" smtClean="0"/>
+              <a:t>)</a:t>
+            </a:r>
+          </a:p>
+          <a:p>
+            <a:r>
+              <a:rPr lang="en-US" dirty="0" smtClean="0"/>
+              <a:t>Committed changes (</a:t>
+            </a:r>
+            <a:r>
+              <a:rPr lang="en-US" dirty="0" smtClean="0">
+                <a:solidFill>
+                  <a:srgbClr val="C00000"/>
+                </a:solidFill>
+              </a:rPr>
+              <a:t>git commit</a:t>
+            </a:r>
+            <a:r>
+              <a:rPr lang="en-US" dirty="0" smtClean="0"/>
+              <a:t>)</a:t>
+            </a:r>
+          </a:p>
+          <a:p>
+            <a:r>
+              <a:rPr lang="en-US" dirty="0" smtClean="0"/>
+              <a:t>Pushed changes to GitHub (</a:t>
+            </a:r>
+            <a:r>
+              <a:rPr lang="en-US" dirty="0" smtClean="0">
+                <a:solidFill>
+                  <a:srgbClr val="C00000"/>
+                </a:solidFill>
+              </a:rPr>
+              <a:t>git push</a:t>
+            </a:r>
+            <a:r>
+              <a:rPr lang="en-US" dirty="0" smtClean="0"/>
+              <a:t>)</a:t>
+            </a:r>
+          </a:p>
+          <a:p>
+            <a:r>
+              <a:rPr lang="en-US" dirty="0" smtClean="0"/>
+              <a:t>Inspected along the way (</a:t>
+            </a:r>
+            <a:r>
+              <a:rPr lang="en-US" dirty="0" smtClean="0">
+                <a:solidFill>
+                  <a:srgbClr val="C00000"/>
+                </a:solidFill>
+              </a:rPr>
+              <a:t>git remote</a:t>
+            </a:r>
+            <a:r>
+              <a:rPr lang="en-US" dirty="0" smtClean="0"/>
+              <a:t>, </a:t>
+            </a:r>
+            <a:r>
+              <a:rPr lang="en-US" dirty="0" smtClean="0">
+                <a:solidFill>
+                  <a:srgbClr val="C00000"/>
+                </a:solidFill>
+              </a:rPr>
+              <a:t>git status</a:t>
+            </a:r>
+            <a:r>
+              <a:rPr lang="en-US" dirty="0" smtClean="0"/>
+              <a:t>, </a:t>
+            </a:r>
+            <a:r>
+              <a:rPr lang="en-US" dirty="0" smtClean="0">
+                <a:solidFill>
+                  <a:srgbClr val="C00000"/>
+                </a:solidFill>
+              </a:rPr>
+              <a:t>git log</a:t>
+            </a:r>
+            <a:r>
+              <a:rPr lang="en-US" dirty="0" smtClean="0"/>
+              <a:t>)</a:t>
             </a:r>
             <a:endParaRPr lang="en-US" dirty="0"/>
           </a:p>
@@ -4339,7 +4527,7 @@
     </p:spTree>
     <p:extLst>
       <p:ext uri="{BB962C8B-B14F-4D97-AF65-F5344CB8AC3E}">
-        <p14:creationId xmlns:p14="http://schemas.microsoft.com/office/powerpoint/2010/main" val="3199936325"/>
+        <p14:creationId xmlns:p14="http://schemas.microsoft.com/office/powerpoint/2010/main" val="3631315944"/>
       </p:ext>
     </p:extLst>
   </p:cSld>
@@ -4390,7 +4578,7 @@
           <a:p>
             <a:r>
               <a:rPr lang="en-US" dirty="0" smtClean="0"/>
-              <a:t>Pushing to GitHub</a:t>
+              <a:t>Forking a repo on GitHub</a:t>
             </a:r>
             <a:endParaRPr lang="en-US" dirty="0"/>
           </a:p>
@@ -4406,40 +4594,102 @@
             <p:ph idx="1"/>
           </p:nvPr>
         </p:nvSpPr>
-        <p:spPr/>
-        <p:txBody>
-          <a:bodyPr/>
-          <a:lstStyle/>
-          <a:p>
-            <a:r>
-              <a:rPr lang="en-US" dirty="0" smtClean="0"/>
-              <a:t>Everything you’ve done to your cloned repo (so far) has been local</a:t>
-            </a:r>
-          </a:p>
-          <a:p>
-            <a:r>
-              <a:rPr lang="en-US" dirty="0" smtClean="0"/>
-              <a:t>Push committed changes to GitHub:</a:t>
-            </a:r>
-          </a:p>
-          <a:p>
-            <a:pPr lvl="1"/>
-            <a:r>
-              <a:rPr lang="en-US" dirty="0" smtClean="0"/>
-              <a:t>git push &lt;remote&gt; &lt;branch&gt;</a:t>
-            </a:r>
-          </a:p>
-          <a:p>
-            <a:pPr lvl="1"/>
-            <a:r>
-              <a:rPr lang="en-US" dirty="0" smtClean="0"/>
-              <a:t>Usually: git push origin master</a:t>
-            </a:r>
-          </a:p>
-          <a:p>
-            <a:r>
-              <a:rPr lang="en-US" dirty="0" smtClean="0"/>
-              <a:t>Refresh your GitHub repo to check!</a:t>
+        <p:spPr>
+          <a:xfrm>
+            <a:off x="457200" y="1447800"/>
+            <a:ext cx="8229600" cy="4876800"/>
+          </a:xfrm>
+        </p:spPr>
+        <p:txBody>
+          <a:bodyPr>
+            <a:normAutofit/>
+          </a:bodyPr>
+          <a:lstStyle/>
+          <a:p>
+            <a:r>
+              <a:rPr lang="en-US" dirty="0" smtClean="0"/>
+              <a:t>What is forking?</a:t>
+            </a:r>
+          </a:p>
+          <a:p>
+            <a:pPr lvl="1"/>
+            <a:r>
+              <a:rPr lang="en-US" dirty="0" smtClean="0"/>
+              <a:t>Copy a repo to your account (including history)</a:t>
+            </a:r>
+          </a:p>
+          <a:p>
+            <a:pPr lvl="1"/>
+            <a:r>
+              <a:rPr lang="en-US" dirty="0" smtClean="0"/>
+              <a:t>Does not stay in sync with the “upstream”</a:t>
+            </a:r>
+          </a:p>
+          <a:p>
+            <a:pPr lvl="1"/>
+            <a:r>
+              <a:rPr lang="en-US" dirty="0" smtClean="0"/>
+              <a:t>Do </a:t>
+            </a:r>
+            <a:r>
+              <a:rPr lang="en-US" dirty="0"/>
+              <a:t>it! </a:t>
+            </a:r>
+            <a:r>
+              <a:rPr lang="en-US" dirty="0" smtClean="0">
+                <a:hlinkClick r:id="rId2"/>
+              </a:rPr>
+              <a:t>git.io/gadsdc2</a:t>
+            </a:r>
+            <a:endParaRPr lang="en-US" dirty="0" smtClean="0"/>
+          </a:p>
+          <a:p>
+            <a:r>
+              <a:rPr lang="en-US" dirty="0" smtClean="0"/>
+              <a:t>Why fork?</a:t>
+            </a:r>
+          </a:p>
+          <a:p>
+            <a:pPr lvl="1"/>
+            <a:r>
+              <a:rPr lang="en-US" dirty="0" smtClean="0"/>
+              <a:t>You want to make modifications</a:t>
+            </a:r>
+          </a:p>
+          <a:p>
+            <a:pPr lvl="1"/>
+            <a:r>
+              <a:rPr lang="en-US" dirty="0" smtClean="0"/>
+              <a:t>You want to contribute to the upstream</a:t>
+            </a:r>
+          </a:p>
+          <a:p>
+            <a:r>
+              <a:rPr lang="en-US" dirty="0" smtClean="0"/>
+              <a:t>Clone your fork: </a:t>
+            </a:r>
+            <a:r>
+              <a:rPr lang="en-US" dirty="0" smtClean="0">
+                <a:solidFill>
+                  <a:srgbClr val="C00000"/>
+                </a:solidFill>
+              </a:rPr>
+              <a:t>git clone &lt;your URL&gt;</a:t>
+            </a:r>
+          </a:p>
+          <a:p>
+            <a:pPr lvl="1"/>
+            <a:r>
+              <a:rPr lang="en-US" dirty="0" smtClean="0"/>
+              <a:t>Don’t clone </a:t>
+            </a:r>
+            <a:r>
+              <a:rPr lang="en-US" dirty="0" smtClean="0"/>
+              <a:t>inside your </a:t>
+            </a:r>
+            <a:r>
+              <a:rPr lang="en-US" dirty="0" smtClean="0"/>
+              <a:t>other local repo</a:t>
             </a:r>
             <a:endParaRPr lang="en-US" dirty="0"/>
           </a:p>
@@ -4448,7 +4698,7 @@
     </p:spTree>
     <p:extLst>
       <p:ext uri="{BB962C8B-B14F-4D97-AF65-F5344CB8AC3E}">
-        <p14:creationId xmlns:p14="http://schemas.microsoft.com/office/powerpoint/2010/main" val="963782855"/>
+        <p14:creationId xmlns:p14="http://schemas.microsoft.com/office/powerpoint/2010/main" val="1904473631"/>
       </p:ext>
     </p:extLst>
   </p:cSld>
@@ -4552,13 +4802,17 @@
           <a:p>
             <a:r>
               <a:rPr lang="en-US" dirty="0" smtClean="0"/>
-              <a:t>What we didn’t cover</a:t>
-            </a:r>
-          </a:p>
-          <a:p>
-            <a:r>
-              <a:rPr lang="en-US" dirty="0" smtClean="0"/>
               <a:t>Further resources</a:t>
+            </a:r>
+          </a:p>
+          <a:p>
+            <a:r>
+              <a:rPr lang="en-US" dirty="0"/>
+              <a:t>What we didn’t </a:t>
+            </a:r>
+            <a:r>
+              <a:rPr lang="en-US" dirty="0" smtClean="0"/>
+              <a:t>cover</a:t>
             </a:r>
             <a:endParaRPr lang="en-US" dirty="0"/>
           </a:p>
@@ -4618,111 +4872,72 @@
           <a:p>
             <a:r>
               <a:rPr lang="en-US" dirty="0" smtClean="0"/>
-              <a:t>Forking a repo on GitHub</a:t>
+              <a:t>GitHub flow for contributing</a:t>
             </a:r>
             <a:endParaRPr lang="en-US" dirty="0"/>
           </a:p>
         </p:txBody>
       </p:sp>
-      <p:sp>
-        <p:nvSpPr>
-          <p:cNvPr id="3" name="Content Placeholder 2"/>
-          <p:cNvSpPr>
-            <a:spLocks noGrp="1"/>
-          </p:cNvSpPr>
+      <p:pic>
+        <p:nvPicPr>
+          <p:cNvPr id="1027" name="Picture 3"/>
+          <p:cNvPicPr>
+            <a:picLocks noGrp="1" noChangeAspect="1" noChangeArrowheads="1"/>
+          </p:cNvPicPr>
           <p:nvPr>
             <p:ph idx="1"/>
           </p:nvPr>
-        </p:nvSpPr>
-        <p:spPr/>
-        <p:txBody>
-          <a:bodyPr>
-            <a:normAutofit lnSpcReduction="10000"/>
-          </a:bodyPr>
-          <a:lstStyle/>
-          <a:p>
-            <a:r>
-              <a:rPr lang="en-US" dirty="0" smtClean="0"/>
-              <a:t>What is forking?</a:t>
-            </a:r>
-          </a:p>
-          <a:p>
-            <a:pPr lvl="1"/>
-            <a:r>
-              <a:rPr lang="en-US" dirty="0" smtClean="0"/>
-              <a:t>Copy a repo to your account (includes everything!)</a:t>
-            </a:r>
-          </a:p>
-          <a:p>
-            <a:pPr lvl="1"/>
-            <a:r>
-              <a:rPr lang="en-US" dirty="0" smtClean="0"/>
-              <a:t>Links to the “upstream” (but does not stay in sync)</a:t>
-            </a:r>
-          </a:p>
-          <a:p>
-            <a:pPr lvl="1"/>
-            <a:r>
-              <a:rPr lang="en-US" dirty="0" smtClean="0"/>
-              <a:t>Do </a:t>
-            </a:r>
-            <a:r>
-              <a:rPr lang="en-US" dirty="0"/>
-              <a:t>it! </a:t>
-            </a:r>
-            <a:r>
-              <a:rPr lang="en-US" dirty="0" smtClean="0">
-                <a:hlinkClick r:id="rId2"/>
-              </a:rPr>
-              <a:t>git.io/gadsdc2</a:t>
-            </a:r>
-            <a:endParaRPr lang="en-US" dirty="0" smtClean="0"/>
-          </a:p>
-          <a:p>
-            <a:pPr lvl="1"/>
-            <a:r>
-              <a:rPr lang="en-US" dirty="0"/>
-              <a:t>Note: This is a GitHub operation</a:t>
-            </a:r>
-            <a:r>
-              <a:rPr lang="en-US" dirty="0" smtClean="0"/>
-              <a:t>!</a:t>
-            </a:r>
-            <a:endParaRPr lang="en-US" dirty="0"/>
-          </a:p>
-          <a:p>
-            <a:r>
-              <a:rPr lang="en-US" dirty="0" smtClean="0"/>
-              <a:t>Why fork?</a:t>
-            </a:r>
-          </a:p>
-          <a:p>
-            <a:pPr lvl="1"/>
-            <a:r>
-              <a:rPr lang="en-US" dirty="0" smtClean="0"/>
-              <a:t>You want a copy of the files on GitHub</a:t>
-            </a:r>
-          </a:p>
-          <a:p>
-            <a:pPr lvl="1"/>
-            <a:r>
-              <a:rPr lang="en-US" dirty="0" smtClean="0"/>
-              <a:t>You want to contribute</a:t>
-            </a:r>
-          </a:p>
-          <a:p>
-            <a:r>
-              <a:rPr lang="en-US" dirty="0" smtClean="0"/>
-              <a:t>Now clone this repo: git clone &lt;your URL&gt;</a:t>
-            </a:r>
-            <a:endParaRPr lang="en-US" dirty="0"/>
-          </a:p>
-        </p:txBody>
-      </p:sp>
+        </p:nvPicPr>
+        <p:blipFill>
+          <a:blip r:embed="rId2">
+            <a:extLst>
+              <a:ext uri="{28A0092B-C50C-407E-A947-70E740481C1C}">
+                <a14:useLocalDpi xmlns:a14="http://schemas.microsoft.com/office/drawing/2010/main" val="0"/>
+              </a:ext>
+            </a:extLst>
+          </a:blip>
+          <a:srcRect/>
+          <a:stretch>
+            <a:fillRect/>
+          </a:stretch>
+        </p:blipFill>
+        <p:spPr bwMode="auto">
+          <a:xfrm>
+            <a:off x="685800" y="1600200"/>
+            <a:ext cx="7696200" cy="4835666"/>
+          </a:xfrm>
+          <a:prstGeom prst="rect">
+            <a:avLst/>
+          </a:prstGeom>
+          <a:noFill/>
+          <a:ln>
+            <a:noFill/>
+          </a:ln>
+          <a:extLst>
+            <a:ext uri="{909E8E84-426E-40DD-AFC4-6F175D3DCCD1}">
+              <a14:hiddenFill xmlns:a14="http://schemas.microsoft.com/office/drawing/2010/main">
+                <a:solidFill>
+                  <a:schemeClr val="accent1"/>
+                </a:solidFill>
+              </a14:hiddenFill>
+            </a:ext>
+            <a:ext uri="{91240B29-F687-4F45-9708-019B960494DF}">
+              <a14:hiddenLine xmlns:a14="http://schemas.microsoft.com/office/drawing/2010/main" w="9525">
+                <a:solidFill>
+                  <a:schemeClr val="tx1"/>
+                </a:solidFill>
+                <a:miter lim="800000"/>
+                <a:headEnd/>
+                <a:tailEnd/>
+              </a14:hiddenLine>
+            </a:ext>
+          </a:extLst>
+        </p:spPr>
+      </p:pic>
     </p:spTree>
     <p:extLst>
       <p:ext uri="{BB962C8B-B14F-4D97-AF65-F5344CB8AC3E}">
-        <p14:creationId xmlns:p14="http://schemas.microsoft.com/office/powerpoint/2010/main" val="1904473631"/>
+        <p14:creationId xmlns:p14="http://schemas.microsoft.com/office/powerpoint/2010/main" val="1334328101"/>
       </p:ext>
     </p:extLst>
   </p:cSld>
@@ -4889,7 +5104,7 @@
           <a:p>
             <a:r>
               <a:rPr lang="en-US" dirty="0" smtClean="0"/>
-              <a:t>Sync your gadsdc2 fork!</a:t>
+              <a:t>Sync your gadsdc2 fork</a:t>
             </a:r>
             <a:endParaRPr lang="en-US" dirty="0"/>
           </a:p>
@@ -4932,6 +5147,14 @@
             <a:pPr lvl="1"/>
             <a:r>
               <a:rPr lang="en-US" dirty="0" smtClean="0"/>
+              <a:t> </a:t>
+            </a:r>
+            <a:r>
+              <a:rPr lang="en-US" dirty="0" smtClean="0">
+                <a:solidFill>
+                  <a:srgbClr val="C00000"/>
+                </a:solidFill>
+              </a:rPr>
               <a:t>git remote add upstream &lt;Aaron’s URL&gt;</a:t>
             </a:r>
           </a:p>
@@ -4939,14 +5162,30 @@
             <a:pPr lvl="1"/>
             <a:r>
               <a:rPr lang="en-US" dirty="0" smtClean="0"/>
-              <a:t>Check that it worked: git remote </a:t>
-            </a:r>
-            <a:r>
-              <a:rPr lang="en-US" dirty="0"/>
+              <a:t>Check that it worked: </a:t>
+            </a:r>
+            <a:r>
+              <a:rPr lang="en-US" dirty="0" smtClean="0">
+                <a:solidFill>
+                  <a:srgbClr val="C00000"/>
+                </a:solidFill>
+              </a:rPr>
+              <a:t>git remote </a:t>
+            </a:r>
+            <a:r>
+              <a:rPr lang="en-US" dirty="0">
+                <a:solidFill>
+                  <a:srgbClr val="C00000"/>
+                </a:solidFill>
+              </a:rPr>
               <a:t>-</a:t>
             </a:r>
             <a:r>
-              <a:rPr lang="en-US" dirty="0" smtClean="0"/>
+              <a:rPr lang="en-US" dirty="0" smtClean="0">
+                <a:solidFill>
+                  <a:srgbClr val="C00000"/>
+                </a:solidFill>
+              </a:rPr>
               <a:t>v</a:t>
             </a:r>
           </a:p>
@@ -4960,6 +5199,21 @@
             <a:pPr lvl="1"/>
             <a:r>
               <a:rPr lang="en-US" dirty="0" smtClean="0"/>
+              <a:t>Like updating your local files from Dropbox</a:t>
+            </a:r>
+          </a:p>
+          <a:p>
+            <a:pPr lvl="1"/>
+            <a:r>
+              <a:rPr lang="en-US" dirty="0" smtClean="0"/>
+              <a:t> </a:t>
+            </a:r>
+            <a:r>
+              <a:rPr lang="en-US" dirty="0" smtClean="0">
+                <a:solidFill>
+                  <a:srgbClr val="C00000"/>
+                </a:solidFill>
+              </a:rPr>
               <a:t>git pull upstream master</a:t>
             </a:r>
           </a:p>
@@ -4967,7 +5221,7 @@
             <a:pPr lvl="1"/>
             <a:r>
               <a:rPr lang="en-US" dirty="0" smtClean="0"/>
-              <a:t>(Does the same thing as “git fetch upstream master” + “git merge upstream/master”)</a:t>
+              <a:t>Pull = fetch + merge (basically)</a:t>
             </a:r>
           </a:p>
           <a:p>
@@ -4987,14 +5241,38 @@
           <a:p>
             <a:pPr lvl="1"/>
             <a:r>
-              <a:rPr lang="en-US" dirty="0"/>
-              <a:t>git push origin </a:t>
-            </a:r>
-            <a:r>
-              <a:rPr lang="en-US" dirty="0" smtClean="0"/>
+              <a:rPr lang="en-US" dirty="0" smtClean="0"/>
+              <a:t> </a:t>
+            </a:r>
+            <a:r>
+              <a:rPr lang="en-US" dirty="0" smtClean="0">
+                <a:solidFill>
+                  <a:srgbClr val="C00000"/>
+                </a:solidFill>
+              </a:rPr>
+              <a:t>git </a:t>
+            </a:r>
+            <a:r>
+              <a:rPr lang="en-US" dirty="0">
+                <a:solidFill>
+                  <a:srgbClr val="C00000"/>
+                </a:solidFill>
+              </a:rPr>
+              <a:t>push origin </a:t>
+            </a:r>
+            <a:r>
+              <a:rPr lang="en-US" dirty="0" smtClean="0">
+                <a:solidFill>
+                  <a:srgbClr val="C00000"/>
+                </a:solidFill>
+              </a:rPr>
               <a:t>master</a:t>
             </a:r>
-            <a:endParaRPr lang="en-US" dirty="0"/>
+            <a:endParaRPr lang="en-US" dirty="0">
+              <a:solidFill>
+                <a:srgbClr val="C00000"/>
+              </a:solidFill>
+            </a:endParaRPr>
           </a:p>
         </p:txBody>
       </p:sp>
@@ -5068,57 +5346,131 @@
             <p:ph idx="1"/>
           </p:nvPr>
         </p:nvSpPr>
-        <p:spPr/>
+        <p:spPr>
+          <a:xfrm>
+            <a:off x="457200" y="1524000"/>
+            <a:ext cx="8229600" cy="4800600"/>
+          </a:xfrm>
+        </p:spPr>
         <p:txBody>
           <a:bodyPr>
-            <a:normAutofit fontScale="77500" lnSpcReduction="20000"/>
+            <a:normAutofit fontScale="85000" lnSpcReduction="10000"/>
           </a:bodyPr>
           <a:lstStyle/>
           <a:p>
             <a:r>
               <a:rPr lang="en-US" dirty="0" smtClean="0"/>
-              <a:t>A branch is a “context” for your work</a:t>
-            </a:r>
-          </a:p>
-          <a:p>
-            <a:r>
-              <a:rPr lang="en-US" dirty="0" smtClean="0"/>
-              <a:t>Branches control your files:</a:t>
-            </a:r>
-          </a:p>
-          <a:p>
-            <a:pPr lvl="1"/>
-            <a:r>
-              <a:rPr lang="en-US" dirty="0" smtClean="0"/>
-              <a:t>Create new branch and switch to it: git checkout -b newbranch</a:t>
-            </a:r>
-          </a:p>
-          <a:p>
-            <a:pPr lvl="1"/>
-            <a:r>
-              <a:rPr lang="en-US" dirty="0" smtClean="0"/>
-              <a:t>Add a file (touch), check that you added it (ls), add it, commit it</a:t>
-            </a:r>
-          </a:p>
-          <a:p>
-            <a:pPr lvl="1"/>
-            <a:r>
-              <a:rPr lang="en-US" dirty="0" smtClean="0"/>
-              <a:t>Switch to master branch: git checkout master</a:t>
+              <a:t>A branch is a “context” for your work:</a:t>
+            </a:r>
+          </a:p>
+          <a:p>
+            <a:pPr lvl="1"/>
+            <a:r>
+              <a:rPr lang="en-US" dirty="0" smtClean="0"/>
+              <a:t>Controls your files</a:t>
+            </a:r>
+          </a:p>
+          <a:p>
+            <a:pPr lvl="1"/>
+            <a:r>
+              <a:rPr lang="en-US" dirty="0" smtClean="0"/>
+              <a:t>Managed by the “.git” folder</a:t>
+            </a:r>
+          </a:p>
+          <a:p>
+            <a:pPr lvl="1"/>
+            <a:r>
+              <a:rPr lang="en-US" dirty="0" smtClean="0"/>
+              <a:t>View your branches: </a:t>
+            </a:r>
+            <a:r>
+              <a:rPr lang="en-US" dirty="0" smtClean="0">
+                <a:solidFill>
+                  <a:srgbClr val="C00000"/>
+                </a:solidFill>
+              </a:rPr>
+              <a:t>git branch</a:t>
+            </a:r>
+          </a:p>
+          <a:p>
+            <a:r>
+              <a:rPr lang="en-US" dirty="0" smtClean="0"/>
+              <a:t>Try branching in the test repo you created:</a:t>
+            </a:r>
+          </a:p>
+          <a:p>
+            <a:pPr lvl="1"/>
+            <a:r>
+              <a:rPr lang="en-US" dirty="0" smtClean="0"/>
+              <a:t>Create branch and switch to it: </a:t>
+            </a:r>
+            <a:r>
+              <a:rPr lang="en-US" dirty="0" smtClean="0">
+                <a:solidFill>
+                  <a:srgbClr val="C00000"/>
+                </a:solidFill>
+              </a:rPr>
+              <a:t>git checkout -b new_branch</a:t>
+            </a:r>
+          </a:p>
+          <a:p>
+            <a:pPr lvl="1"/>
+            <a:r>
+              <a:rPr lang="en-US" dirty="0" smtClean="0"/>
+              <a:t>Create a file, stage the change, commit it</a:t>
+            </a:r>
+          </a:p>
+          <a:p>
+            <a:pPr lvl="1"/>
+            <a:r>
+              <a:rPr lang="en-US" dirty="0" smtClean="0"/>
+              <a:t>Switch to the master branch: </a:t>
+            </a:r>
+            <a:r>
+              <a:rPr lang="en-US" dirty="0" smtClean="0">
+                <a:solidFill>
+                  <a:srgbClr val="C00000"/>
+                </a:solidFill>
+              </a:rPr>
+              <a:t>git checkout master</a:t>
             </a:r>
           </a:p>
           <a:p>
             <a:pPr lvl="2"/>
             <a:r>
               <a:rPr lang="en-US" dirty="0" smtClean="0"/>
-              <a:t>ls: the file is gone!</a:t>
+              <a:t> </a:t>
+            </a:r>
+            <a:r>
+              <a:rPr lang="en-US" dirty="0" smtClean="0">
+                <a:solidFill>
+                  <a:srgbClr val="C00000"/>
+                </a:solidFill>
+              </a:rPr>
+              <a:t>ls</a:t>
+            </a:r>
+            <a:r>
+              <a:rPr lang="en-US" dirty="0" smtClean="0"/>
+              <a:t>: the file is gone!</a:t>
             </a:r>
           </a:p>
           <a:p>
             <a:pPr lvl="2"/>
             <a:r>
               <a:rPr lang="en-US" dirty="0" smtClean="0"/>
-              <a:t>git log: the commit is gone!</a:t>
+              <a:t> </a:t>
+            </a:r>
+            <a:r>
+              <a:rPr lang="en-US" dirty="0" smtClean="0">
+                <a:solidFill>
+                  <a:srgbClr val="C00000"/>
+                </a:solidFill>
+              </a:rPr>
+              <a:t>git log</a:t>
+            </a:r>
+            <a:r>
+              <a:rPr lang="en-US" dirty="0" smtClean="0"/>
+              <a:t>: the commit is gone!</a:t>
             </a:r>
             <a:endParaRPr lang="en-US" dirty="0"/>
           </a:p>
@@ -5126,47 +5478,23 @@
             <a:pPr lvl="1"/>
             <a:r>
               <a:rPr lang="en-US" dirty="0" smtClean="0"/>
-              <a:t>Switch to other branch: git checkout newbranch</a:t>
+              <a:t>Switch to the new branch: </a:t>
+            </a:r>
+            <a:r>
+              <a:rPr lang="en-US" dirty="0" smtClean="0">
+                <a:solidFill>
+                  <a:srgbClr val="C00000"/>
+                </a:solidFill>
+              </a:rPr>
+              <a:t>git checkout new_branch</a:t>
             </a:r>
           </a:p>
           <a:p>
             <a:pPr lvl="2"/>
             <a:r>
               <a:rPr lang="en-US" dirty="0" smtClean="0"/>
-              <a:t>Phew, it’s still there</a:t>
-            </a:r>
-          </a:p>
-          <a:p>
-            <a:r>
-              <a:rPr lang="en-US" dirty="0" smtClean="0"/>
-              <a:t>Deleting a branch</a:t>
-            </a:r>
-            <a:endParaRPr lang="en-US" dirty="0"/>
-          </a:p>
-          <a:p>
-            <a:pPr lvl="1"/>
-            <a:r>
-              <a:rPr lang="en-US" dirty="0" smtClean="0"/>
-              <a:t>Switch back to master: git checkout master</a:t>
-            </a:r>
-          </a:p>
-          <a:p>
-            <a:pPr lvl="1"/>
-            <a:r>
-              <a:rPr lang="en-US" dirty="0" smtClean="0"/>
-              <a:t>git branch -d newbranch (generates error)</a:t>
-            </a:r>
-          </a:p>
-          <a:p>
-            <a:pPr lvl="1"/>
-            <a:r>
-              <a:rPr lang="en-US" dirty="0" smtClean="0"/>
-              <a:t>git branch -D newbranch (force the deletion)</a:t>
-            </a:r>
-            <a:endParaRPr lang="en-US" dirty="0"/>
-          </a:p>
-          <a:p>
-            <a:endParaRPr lang="en-US" dirty="0"/>
+              <a:t>The file and commit are back</a:t>
+            </a:r>
           </a:p>
         </p:txBody>
       </p:sp>
@@ -5224,72 +5552,181 @@
           <a:p>
             <a:r>
               <a:rPr lang="en-US" dirty="0" smtClean="0"/>
-              <a:t>GitHub flow for contributing</a:t>
+              <a:t>Recipe for submitting homework</a:t>
             </a:r>
             <a:endParaRPr lang="en-US" dirty="0"/>
           </a:p>
         </p:txBody>
       </p:sp>
-      <p:pic>
-        <p:nvPicPr>
-          <p:cNvPr id="1027" name="Picture 3"/>
-          <p:cNvPicPr>
-            <a:picLocks noGrp="1" noChangeAspect="1" noChangeArrowheads="1"/>
-          </p:cNvPicPr>
+      <p:sp>
+        <p:nvSpPr>
+          <p:cNvPr id="3" name="Content Placeholder 2"/>
+          <p:cNvSpPr>
+            <a:spLocks noGrp="1"/>
+          </p:cNvSpPr>
           <p:nvPr>
             <p:ph idx="1"/>
           </p:nvPr>
-        </p:nvPicPr>
-        <p:blipFill>
-          <a:blip r:embed="rId2">
-            <a:extLst>
-              <a:ext uri="{28A0092B-C50C-407E-A947-70E740481C1C}">
-                <a14:useLocalDpi xmlns:a14="http://schemas.microsoft.com/office/drawing/2010/main" val="0"/>
-              </a:ext>
-            </a:extLst>
-          </a:blip>
-          <a:srcRect/>
-          <a:stretch>
-            <a:fillRect/>
-          </a:stretch>
-        </p:blipFill>
-        <p:spPr bwMode="auto">
+        </p:nvSpPr>
+        <p:spPr>
           <a:xfrm>
-            <a:off x="685800" y="1600200"/>
-            <a:ext cx="7696200" cy="4835666"/>
+            <a:off x="457200" y="1447800"/>
+            <a:ext cx="8229600" cy="4876800"/>
           </a:xfrm>
-          <a:prstGeom prst="rect">
-            <a:avLst/>
-          </a:prstGeom>
-          <a:noFill/>
-          <a:ln>
-            <a:noFill/>
-          </a:ln>
-          <a:extLst>
-            <a:ext uri="{909E8E84-426E-40DD-AFC4-6F175D3DCCD1}">
-              <a14:hiddenFill xmlns:a14="http://schemas.microsoft.com/office/drawing/2010/main">
-                <a:solidFill>
-                  <a:schemeClr val="accent1"/>
-                </a:solidFill>
-              </a14:hiddenFill>
-            </a:ext>
-            <a:ext uri="{91240B29-F687-4F45-9708-019B960494DF}">
-              <a14:hiddenLine xmlns:a14="http://schemas.microsoft.com/office/drawing/2010/main" w="9525">
-                <a:solidFill>
-                  <a:schemeClr val="tx1"/>
-                </a:solidFill>
-                <a:miter lim="800000"/>
-                <a:headEnd/>
-                <a:tailEnd/>
-              </a14:hiddenLine>
-            </a:ext>
-          </a:extLst>
         </p:spPr>
-      </p:pic>
+        <p:txBody>
+          <a:bodyPr>
+            <a:normAutofit/>
+          </a:bodyPr>
+          <a:lstStyle/>
+          <a:p>
+            <a:pPr marL="514350" indent="-514350">
+              <a:buFont typeface="+mj-lt"/>
+              <a:buAutoNum type="arabicPeriod"/>
+            </a:pPr>
+            <a:r>
+              <a:rPr lang="en-US" dirty="0" smtClean="0"/>
+              <a:t> </a:t>
+            </a:r>
+            <a:r>
+              <a:rPr lang="en-US" dirty="0" smtClean="0">
+                <a:solidFill>
+                  <a:srgbClr val="C00000"/>
+                </a:solidFill>
+              </a:rPr>
+              <a:t>git checkout master</a:t>
+            </a:r>
+          </a:p>
+          <a:p>
+            <a:pPr marL="514350" indent="-514350">
+              <a:buFont typeface="+mj-lt"/>
+              <a:buAutoNum type="arabicPeriod"/>
+            </a:pPr>
+            <a:r>
+              <a:rPr lang="en-US" dirty="0" smtClean="0"/>
+              <a:t> </a:t>
+            </a:r>
+            <a:r>
+              <a:rPr lang="en-US" dirty="0" smtClean="0">
+                <a:solidFill>
+                  <a:srgbClr val="C00000"/>
+                </a:solidFill>
+              </a:rPr>
+              <a:t>git pull upstream master</a:t>
+            </a:r>
+          </a:p>
+          <a:p>
+            <a:pPr marL="514350" indent="-514350">
+              <a:buFont typeface="+mj-lt"/>
+              <a:buAutoNum type="arabicPeriod"/>
+            </a:pPr>
+            <a:r>
+              <a:rPr lang="en-US" dirty="0" smtClean="0"/>
+              <a:t> </a:t>
+            </a:r>
+            <a:r>
+              <a:rPr lang="en-US" dirty="0" smtClean="0">
+                <a:solidFill>
+                  <a:srgbClr val="C00000"/>
+                </a:solidFill>
+              </a:rPr>
+              <a:t>git checkout -b name_of_branch</a:t>
+            </a:r>
+          </a:p>
+          <a:p>
+            <a:pPr marL="514350" indent="-514350">
+              <a:buFont typeface="+mj-lt"/>
+              <a:buAutoNum type="arabicPeriod"/>
+            </a:pPr>
+            <a:r>
+              <a:rPr lang="en-US" dirty="0" smtClean="0"/>
+              <a:t> do your assignment</a:t>
+            </a:r>
+          </a:p>
+          <a:p>
+            <a:pPr marL="514350" indent="-514350">
+              <a:buFont typeface="+mj-lt"/>
+              <a:buAutoNum type="arabicPeriod"/>
+            </a:pPr>
+            <a:r>
+              <a:rPr lang="en-US" dirty="0" smtClean="0"/>
+              <a:t> </a:t>
+            </a:r>
+            <a:r>
+              <a:rPr lang="en-US" dirty="0" smtClean="0">
+                <a:solidFill>
+                  <a:srgbClr val="C00000"/>
+                </a:solidFill>
+              </a:rPr>
+              <a:t>git add </a:t>
+            </a:r>
+            <a:r>
+              <a:rPr lang="en-US" dirty="0">
+                <a:solidFill>
+                  <a:srgbClr val="C00000"/>
+                </a:solidFill>
+              </a:rPr>
+              <a:t>.</a:t>
+            </a:r>
+            <a:endParaRPr lang="en-US" dirty="0" smtClean="0">
+              <a:solidFill>
+                <a:srgbClr val="C00000"/>
+              </a:solidFill>
+            </a:endParaRPr>
+          </a:p>
+          <a:p>
+            <a:pPr marL="514350" indent="-514350">
+              <a:buFont typeface="+mj-lt"/>
+              <a:buAutoNum type="arabicPeriod"/>
+            </a:pPr>
+            <a:r>
+              <a:rPr lang="en-US" dirty="0" smtClean="0"/>
+              <a:t> </a:t>
+            </a:r>
+            <a:r>
+              <a:rPr lang="en-US" dirty="0" smtClean="0">
+                <a:solidFill>
+                  <a:srgbClr val="C00000"/>
+                </a:solidFill>
+              </a:rPr>
+              <a:t>git commit -m “message”</a:t>
+            </a:r>
+          </a:p>
+          <a:p>
+            <a:pPr marL="514350" indent="-514350">
+              <a:buFont typeface="+mj-lt"/>
+              <a:buAutoNum type="arabicPeriod"/>
+            </a:pPr>
+            <a:r>
+              <a:rPr lang="en-US" dirty="0" smtClean="0"/>
+              <a:t> </a:t>
+            </a:r>
+            <a:r>
+              <a:rPr lang="en-US" dirty="0" smtClean="0">
+                <a:solidFill>
+                  <a:srgbClr val="C00000"/>
+                </a:solidFill>
+              </a:rPr>
+              <a:t>git push origin name_of_branch</a:t>
+            </a:r>
+          </a:p>
+          <a:p>
+            <a:pPr marL="514350" indent="-514350">
+              <a:buFont typeface="+mj-lt"/>
+              <a:buAutoNum type="arabicPeriod"/>
+            </a:pPr>
+            <a:r>
+              <a:rPr lang="en-US" dirty="0" smtClean="0"/>
+              <a:t>GitHub: switch to branch, submit pull request</a:t>
+            </a:r>
+            <a:endParaRPr lang="en-US" dirty="0"/>
+          </a:p>
+        </p:txBody>
+      </p:sp>
     </p:spTree>
     <p:extLst>
       <p:ext uri="{BB962C8B-B14F-4D97-AF65-F5344CB8AC3E}">
-        <p14:creationId xmlns:p14="http://schemas.microsoft.com/office/powerpoint/2010/main" val="1334328101"/>
+        <p14:creationId xmlns:p14="http://schemas.microsoft.com/office/powerpoint/2010/main" val="1158024077"/>
       </p:ext>
     </p:extLst>
   </p:cSld>
@@ -5340,7 +5777,7 @@
           <a:p>
             <a:r>
               <a:rPr lang="en-US" dirty="0" smtClean="0"/>
-              <a:t>Recipe for submitting assignments</a:t>
+              <a:t>Further resources</a:t>
             </a:r>
             <a:endParaRPr lang="en-US" dirty="0"/>
           </a:p>
@@ -5356,58 +5793,108 @@
             <p:ph idx="1"/>
           </p:nvPr>
         </p:nvSpPr>
-        <p:spPr/>
-        <p:txBody>
-          <a:bodyPr>
-            <a:normAutofit lnSpcReduction="10000"/>
-          </a:bodyPr>
-          <a:lstStyle/>
-          <a:p>
-            <a:r>
-              <a:rPr lang="en-US" dirty="0" smtClean="0"/>
-              <a:t>git checkout master</a:t>
-            </a:r>
-          </a:p>
-          <a:p>
-            <a:r>
-              <a:rPr lang="en-US" dirty="0" smtClean="0"/>
-              <a:t>git pull upstream master</a:t>
-            </a:r>
-          </a:p>
-          <a:p>
-            <a:r>
-              <a:rPr lang="en-US" dirty="0" smtClean="0"/>
-              <a:t>git checkout -b &lt;branchname&gt;</a:t>
-            </a:r>
-          </a:p>
-          <a:p>
-            <a:r>
-              <a:rPr lang="en-US" dirty="0" smtClean="0"/>
-              <a:t># do your assignment</a:t>
-            </a:r>
-          </a:p>
-          <a:p>
-            <a:r>
-              <a:rPr lang="en-US" dirty="0" smtClean="0"/>
-              <a:t>git add &lt;filename&gt;</a:t>
-            </a:r>
-          </a:p>
-          <a:p>
-            <a:r>
-              <a:rPr lang="en-US" dirty="0" smtClean="0"/>
-              <a:t>git commit -m “message”</a:t>
-            </a:r>
-          </a:p>
-          <a:p>
-            <a:r>
-              <a:rPr lang="en-US" dirty="0" smtClean="0"/>
-              <a:t>git push origin &lt;branchname&gt;</a:t>
-            </a:r>
-          </a:p>
-          <a:p>
-            <a:r>
-              <a:rPr lang="en-US" dirty="0" smtClean="0"/>
-              <a:t>GitHub: switch to &lt;branchname&gt;, submit PR</a:t>
+        <p:spPr>
+          <a:xfrm>
+            <a:off x="457200" y="1600200"/>
+            <a:ext cx="8229600" cy="4525963"/>
+          </a:xfrm>
+        </p:spPr>
+        <p:txBody>
+          <a:bodyPr/>
+          <a:lstStyle/>
+          <a:p>
+            <a:r>
+              <a:rPr lang="en-US" dirty="0"/>
+              <a:t>Pro Git (book): </a:t>
+            </a:r>
+            <a:r>
+              <a:rPr lang="en-US" dirty="0" smtClean="0">
+                <a:hlinkClick r:id="rId2"/>
+              </a:rPr>
+              <a:t>git-scm.com/book</a:t>
+            </a:r>
+            <a:endParaRPr lang="en-US" dirty="0" smtClean="0"/>
+          </a:p>
+          <a:p>
+            <a:r>
+              <a:rPr lang="en-US" dirty="0"/>
+              <a:t>Git Reference: </a:t>
+            </a:r>
+            <a:r>
+              <a:rPr lang="en-US" dirty="0" smtClean="0">
+                <a:hlinkClick r:id="rId3"/>
+              </a:rPr>
+              <a:t>gitref.org</a:t>
+            </a:r>
+            <a:endParaRPr lang="en-US" dirty="0" smtClean="0"/>
+          </a:p>
+          <a:p>
+            <a:r>
+              <a:rPr lang="en-US" dirty="0" smtClean="0"/>
+              <a:t>Recipe for submitting homework: </a:t>
+            </a:r>
+            <a:r>
+              <a:rPr lang="en-US" dirty="0" smtClean="0">
+                <a:hlinkClick r:id="rId4"/>
+              </a:rPr>
+              <a:t>git.io/recipe</a:t>
+            </a:r>
+            <a:endParaRPr lang="en-US" dirty="0" smtClean="0"/>
+          </a:p>
+          <a:p>
+            <a:r>
+              <a:rPr lang="en-US" dirty="0" smtClean="0"/>
+              <a:t>My quick reference </a:t>
+            </a:r>
+            <a:r>
+              <a:rPr lang="en-US" dirty="0"/>
+              <a:t>guide: </a:t>
+            </a:r>
+            <a:r>
+              <a:rPr lang="en-US" dirty="0" smtClean="0">
+                <a:hlinkClick r:id="rId5"/>
+              </a:rPr>
+              <a:t>tiny.cc/</a:t>
+            </a:r>
+            <a:r>
+              <a:rPr lang="en-US" dirty="0" err="1" smtClean="0">
+                <a:hlinkClick r:id="rId5"/>
+              </a:rPr>
+              <a:t>gitref</a:t>
+            </a:r>
+            <a:endParaRPr lang="en-US" dirty="0" smtClean="0"/>
+          </a:p>
+          <a:p>
+            <a:pPr lvl="1"/>
+            <a:r>
+              <a:rPr lang="en-US" dirty="0" smtClean="0"/>
+              <a:t>Common sets of commands explained</a:t>
+            </a:r>
+          </a:p>
+          <a:p>
+            <a:r>
+              <a:rPr lang="en-US" dirty="0" smtClean="0"/>
+              <a:t>My video series: </a:t>
+            </a:r>
+            <a:r>
+              <a:rPr lang="en-US" dirty="0" smtClean="0">
+                <a:hlinkClick r:id="rId6"/>
+              </a:rPr>
+              <a:t>tiny.cc/</a:t>
+            </a:r>
+            <a:r>
+              <a:rPr lang="en-US" dirty="0" err="1" smtClean="0">
+                <a:hlinkClick r:id="rId6"/>
+              </a:rPr>
+              <a:t>gitvideos</a:t>
+            </a:r>
+            <a:endParaRPr lang="en-US" dirty="0" smtClean="0"/>
+          </a:p>
+          <a:p>
+            <a:pPr lvl="1"/>
+            <a:r>
+              <a:rPr lang="en-US" dirty="0" smtClean="0"/>
+              <a:t>Watch most of this presentation again!</a:t>
             </a:r>
             <a:endParaRPr lang="en-US" dirty="0"/>
           </a:p>
@@ -5416,7 +5903,7 @@
     </p:spTree>
     <p:extLst>
       <p:ext uri="{BB962C8B-B14F-4D97-AF65-F5344CB8AC3E}">
-        <p14:creationId xmlns:p14="http://schemas.microsoft.com/office/powerpoint/2010/main" val="1158024077"/>
+        <p14:creationId xmlns:p14="http://schemas.microsoft.com/office/powerpoint/2010/main" val="2577650722"/>
       </p:ext>
     </p:extLst>
   </p:cSld>
@@ -5493,13 +5980,25 @@
         </p:spPr>
         <p:txBody>
           <a:bodyPr>
-            <a:normAutofit lnSpcReduction="10000"/>
+            <a:normAutofit/>
           </a:bodyPr>
           <a:lstStyle/>
           <a:p>
             <a:r>
               <a:rPr lang="en-US" dirty="0" smtClean="0"/>
-              <a:t>Initializing a repo locally (git init), then later pushing it to GitHub</a:t>
+              <a:t>Initializing a repo locally (</a:t>
+            </a:r>
+            <a:r>
+              <a:rPr lang="en-US" dirty="0" smtClean="0">
+                <a:solidFill>
+                  <a:srgbClr val="C00000"/>
+                </a:solidFill>
+              </a:rPr>
+              <a:t>git init</a:t>
+            </a:r>
+            <a:r>
+              <a:rPr lang="en-US" dirty="0" smtClean="0"/>
+              <a:t>), then later pushing it to GitHub</a:t>
             </a:r>
           </a:p>
           <a:p>
@@ -5511,19 +6010,13 @@
           <a:p>
             <a:r>
               <a:rPr lang="en-US" dirty="0" smtClean="0"/>
-              <a:t>Deleting a repo on GitHub (easy)</a:t>
-            </a:r>
-          </a:p>
-          <a:p>
-            <a:r>
-              <a:rPr lang="en-US" dirty="0" smtClean="0"/>
-              <a:t>Using .gitignore so that Git ignores files</a:t>
-            </a:r>
-          </a:p>
-          <a:p>
-            <a:r>
-              <a:rPr lang="en-US" dirty="0" smtClean="0"/>
-              <a:t>Viewing diffs using Git</a:t>
+              <a:t>Deleting a branch</a:t>
+            </a:r>
+          </a:p>
+          <a:p>
+            <a:r>
+              <a:rPr lang="en-US" dirty="0" smtClean="0"/>
+              <a:t>Using .gitignore to ignore certain files</a:t>
             </a:r>
           </a:p>
           <a:p>
@@ -5551,146 +6044,6 @@
     <p:extLst>
       <p:ext uri="{BB962C8B-B14F-4D97-AF65-F5344CB8AC3E}">
         <p14:creationId xmlns:p14="http://schemas.microsoft.com/office/powerpoint/2010/main" val="1093512580"/>
-      </p:ext>
-    </p:extLst>
-  </p:cSld>
-  <p:clrMapOvr>
-    <a:masterClrMapping/>
-  </p:clrMapOvr>
-  <p:timing>
-    <p:tnLst>
-      <p:par>
-        <p:cTn id="1" dur="indefinite" restart="never" nodeType="tmRoot"/>
-      </p:par>
-    </p:tnLst>
-  </p:timing>
-</p:sld>
-</file>
-
-<file path=ppt/slides/slide27.xml><?xml version="1.0" encoding="utf-8"?>
-<p:sld xmlns:a="http://schemas.openxmlformats.org/drawingml/2006/main" xmlns:r="http://schemas.openxmlformats.org/officeDocument/2006/relationships" xmlns:p="http://schemas.openxmlformats.org/presentationml/2006/main">
-  <p:cSld>
-    <p:spTree>
-      <p:nvGrpSpPr>
-        <p:cNvPr id="1" name=""/>
-        <p:cNvGrpSpPr/>
-        <p:nvPr/>
-      </p:nvGrpSpPr>
-      <p:grpSpPr>
-        <a:xfrm>
-          <a:off x="0" y="0"/>
-          <a:ext cx="0" cy="0"/>
-          <a:chOff x="0" y="0"/>
-          <a:chExt cx="0" cy="0"/>
-        </a:xfrm>
-      </p:grpSpPr>
-      <p:sp>
-        <p:nvSpPr>
-          <p:cNvPr id="2" name="Title 1"/>
-          <p:cNvSpPr>
-            <a:spLocks noGrp="1"/>
-          </p:cNvSpPr>
-          <p:nvPr>
-            <p:ph type="title"/>
-          </p:nvPr>
-        </p:nvSpPr>
-        <p:spPr/>
-        <p:txBody>
-          <a:bodyPr/>
-          <a:lstStyle/>
-          <a:p>
-            <a:r>
-              <a:rPr lang="en-US" dirty="0" smtClean="0"/>
-              <a:t>Further resources</a:t>
-            </a:r>
-            <a:endParaRPr lang="en-US" dirty="0"/>
-          </a:p>
-        </p:txBody>
-      </p:sp>
-      <p:sp>
-        <p:nvSpPr>
-          <p:cNvPr id="3" name="Content Placeholder 2"/>
-          <p:cNvSpPr>
-            <a:spLocks noGrp="1"/>
-          </p:cNvSpPr>
-          <p:nvPr>
-            <p:ph idx="1"/>
-          </p:nvPr>
-        </p:nvSpPr>
-        <p:spPr/>
-        <p:txBody>
-          <a:bodyPr/>
-          <a:lstStyle/>
-          <a:p>
-            <a:r>
-              <a:rPr lang="en-US" dirty="0"/>
-              <a:t>Pro Git (book): </a:t>
-            </a:r>
-            <a:r>
-              <a:rPr lang="en-US" dirty="0" smtClean="0">
-                <a:hlinkClick r:id="rId2"/>
-              </a:rPr>
-              <a:t>git-scm.com/book</a:t>
-            </a:r>
-            <a:endParaRPr lang="en-US" dirty="0" smtClean="0"/>
-          </a:p>
-          <a:p>
-            <a:r>
-              <a:rPr lang="en-US" dirty="0"/>
-              <a:t>Git Reference: </a:t>
-            </a:r>
-            <a:r>
-              <a:rPr lang="en-US" dirty="0" smtClean="0">
-                <a:hlinkClick r:id="rId3"/>
-              </a:rPr>
-              <a:t>gitref.org</a:t>
-            </a:r>
-            <a:endParaRPr lang="en-US" dirty="0" smtClean="0"/>
-          </a:p>
-          <a:p>
-            <a:r>
-              <a:rPr lang="en-US" dirty="0" smtClean="0"/>
-              <a:t>My </a:t>
-            </a:r>
-            <a:r>
-              <a:rPr lang="en-US" dirty="0"/>
-              <a:t>reference guide: </a:t>
-            </a:r>
-            <a:r>
-              <a:rPr lang="en-US" dirty="0" smtClean="0">
-                <a:hlinkClick r:id="rId4"/>
-              </a:rPr>
-              <a:t>tiny.cc/</a:t>
-            </a:r>
-            <a:r>
-              <a:rPr lang="en-US" dirty="0" err="1" smtClean="0">
-                <a:hlinkClick r:id="rId4"/>
-              </a:rPr>
-              <a:t>gitref</a:t>
-            </a:r>
-            <a:endParaRPr lang="en-US" dirty="0" smtClean="0"/>
-          </a:p>
-          <a:p>
-            <a:pPr lvl="1"/>
-            <a:r>
-              <a:rPr lang="en-US" dirty="0" smtClean="0"/>
-              <a:t>Common sets of commands explained</a:t>
-            </a:r>
-          </a:p>
-          <a:p>
-            <a:pPr lvl="1"/>
-            <a:r>
-              <a:rPr lang="en-US" dirty="0" smtClean="0"/>
-              <a:t>Links to my video series (watch most of this presentation again!)</a:t>
-            </a:r>
-            <a:endParaRPr lang="en-US" dirty="0"/>
-          </a:p>
-        </p:txBody>
-      </p:sp>
-    </p:spTree>
-    <p:extLst>
-      <p:ext uri="{BB962C8B-B14F-4D97-AF65-F5344CB8AC3E}">
-        <p14:creationId xmlns:p14="http://schemas.microsoft.com/office/powerpoint/2010/main" val="2577650722"/>
       </p:ext>
     </p:extLst>
   </p:cSld>
@@ -5759,12 +6112,14 @@
         </p:nvSpPr>
         <p:spPr/>
         <p:txBody>
-          <a:bodyPr/>
-          <a:lstStyle/>
-          <a:p>
-            <a:r>
-              <a:rPr lang="en-US" dirty="0" smtClean="0"/>
-              <a:t>System for version control</a:t>
+          <a:bodyPr>
+            <a:normAutofit/>
+          </a:bodyPr>
+          <a:lstStyle/>
+          <a:p>
+            <a:r>
+              <a:rPr lang="en-US" dirty="0" smtClean="0"/>
+              <a:t>Version control system that allows you to track files and file changes in a repository (“repo”)</a:t>
             </a:r>
           </a:p>
           <a:p>
@@ -5776,13 +6131,7 @@
           <a:p>
             <a:r>
               <a:rPr lang="en-US" dirty="0" smtClean="0"/>
-              <a:t>Runs from the command line</a:t>
-            </a:r>
-          </a:p>
-          <a:p>
-            <a:r>
-              <a:rPr lang="en-US" dirty="0" smtClean="0"/>
-              <a:t>Allows you to track files and file changes in a repository (aka “repo”)</a:t>
+              <a:t>Runs from the command line (usually)</a:t>
             </a:r>
           </a:p>
           <a:p>
@@ -5790,14 +6139,6 @@
               <a:rPr lang="en-US" dirty="0" smtClean="0"/>
               <a:t>Can be used alone or in a team</a:t>
             </a:r>
-          </a:p>
-          <a:p>
-            <a:pPr lvl="1"/>
-            <a:r>
-              <a:rPr lang="en-US" dirty="0" smtClean="0"/>
-              <a:t>Team members can work independently on the same files and merge changes together</a:t>
-            </a:r>
-            <a:endParaRPr lang="en-US" dirty="0"/>
           </a:p>
         </p:txBody>
       </p:sp>
@@ -5874,7 +6215,7 @@
         <p:spPr/>
         <p:txBody>
           <a:bodyPr>
-            <a:normAutofit lnSpcReduction="10000"/>
+            <a:normAutofit/>
           </a:bodyPr>
           <a:lstStyle/>
           <a:p>
@@ -5913,14 +6254,7 @@
             <a:pPr lvl="1"/>
             <a:r>
               <a:rPr lang="en-US" dirty="0" smtClean="0"/>
-              <a:t>Others can navigate your repos</a:t>
-            </a:r>
-          </a:p>
-          <a:p>
-            <a:pPr lvl="1"/>
-            <a:r>
-              <a:rPr lang="en-US" dirty="0" smtClean="0"/>
-              <a:t>Easy to collaborate on repos</a:t>
+              <a:t>Makes repo collaboration easy</a:t>
             </a:r>
           </a:p>
           <a:p>
@@ -6016,25 +6350,19 @@
           <a:p>
             <a:r>
               <a:rPr lang="en-US" dirty="0" smtClean="0"/>
-              <a:t>Data scientists write code</a:t>
-            </a:r>
-          </a:p>
-          <a:p>
-            <a:r>
-              <a:rPr lang="en-US" dirty="0" smtClean="0"/>
-              <a:t>Version control is useful when you write code</a:t>
-            </a:r>
-          </a:p>
-          <a:p>
-            <a:r>
-              <a:rPr lang="en-US" dirty="0" smtClean="0"/>
-              <a:t>Allows you collaborate more effectively with colleagues</a:t>
-            </a:r>
-          </a:p>
-          <a:p>
-            <a:r>
-              <a:rPr lang="en-US" dirty="0" smtClean="0"/>
-              <a:t>Allows you to contribute to open source projects</a:t>
+              <a:t>Version control is useful when you write code, and data scientists write code</a:t>
+            </a:r>
+          </a:p>
+          <a:p>
+            <a:r>
+              <a:rPr lang="en-US" dirty="0" smtClean="0"/>
+              <a:t>Enables teams to easily collaborate on the same codebase</a:t>
+            </a:r>
+          </a:p>
+          <a:p>
+            <a:r>
+              <a:rPr lang="en-US" dirty="0" smtClean="0"/>
+              <a:t>Enables you to contribute to open source projects</a:t>
             </a:r>
           </a:p>
           <a:p>
@@ -6118,18 +6446,14 @@
         </p:nvSpPr>
         <p:spPr/>
         <p:txBody>
-          <a:bodyPr/>
-          <a:lstStyle/>
-          <a:p>
-            <a:r>
-              <a:rPr lang="en-US" dirty="0" smtClean="0"/>
-              <a:t>Designed (by programmers) for power and flexibility over ease of use</a:t>
-            </a:r>
-          </a:p>
-          <a:p>
-            <a:r>
-              <a:rPr lang="en-US" dirty="0" smtClean="0"/>
-              <a:t>Many ways to accomplish the same task</a:t>
+          <a:bodyPr>
+            <a:normAutofit/>
+          </a:bodyPr>
+          <a:lstStyle/>
+          <a:p>
+            <a:r>
+              <a:rPr lang="en-US" dirty="0" smtClean="0"/>
+              <a:t>Designed (by programmers) for power and flexibility over simplicity</a:t>
             </a:r>
           </a:p>
           <a:p>
@@ -6141,22 +6465,14 @@
           <a:p>
             <a:r>
               <a:rPr lang="en-US" dirty="0" smtClean="0"/>
-              <a:t>Most actions are permanent (hard to explore)</a:t>
-            </a:r>
-          </a:p>
-          <a:p>
-            <a:r>
-              <a:rPr lang="en-US" dirty="0" smtClean="0"/>
-              <a:t>Hard for others to troubleshoot</a:t>
-            </a:r>
-          </a:p>
-          <a:p>
-            <a:r>
-              <a:rPr lang="en-US" dirty="0" smtClean="0"/>
-              <a:t>Most reference materials are not written for beginners</a:t>
-            </a:r>
-          </a:p>
-          <a:p>
+              <a:t>Hard to explore since most actions are “permanent” (in a sense) and can have serious consequences</a:t>
+            </a:r>
+          </a:p>
+          <a:p>
+            <a:r>
+              <a:rPr lang="en-US" dirty="0" smtClean="0"/>
+              <a:t>Most learning resources are command-focused instead of workflow-focused</a:t>
+            </a:r>
             <a:endParaRPr lang="en-US" dirty="0"/>
           </a:p>
         </p:txBody>
@@ -6210,14 +6526,12 @@
         </p:nvSpPr>
         <p:spPr/>
         <p:txBody>
-          <a:bodyPr>
-            <a:normAutofit fontScale="90000"/>
-          </a:bodyPr>
-          <a:lstStyle/>
-          <a:p>
-            <a:r>
-              <a:rPr lang="en-US" dirty="0" smtClean="0"/>
-              <a:t>Beginner mistakes (that we will avoid!)</a:t>
+          <a:bodyPr/>
+          <a:lstStyle/>
+          <a:p>
+            <a:r>
+              <a:rPr lang="en-US" dirty="0" smtClean="0"/>
+              <a:t>Don’t sweat it!</a:t>
             </a:r>
             <a:endParaRPr lang="en-US" dirty="0"/>
           </a:p>
@@ -6240,25 +6554,25 @@
           <a:p>
             <a:r>
               <a:rPr lang="en-US" dirty="0" smtClean="0"/>
-              <a:t>Misunderstanding the difference between Git and GitHub</a:t>
-            </a:r>
-          </a:p>
-          <a:p>
-            <a:r>
-              <a:rPr lang="en-US" dirty="0" smtClean="0"/>
-              <a:t>Typing commands without knowing what they do (can be a good thing in other languages)</a:t>
-            </a:r>
-          </a:p>
-          <a:p>
-            <a:r>
-              <a:rPr lang="en-US" dirty="0" smtClean="0"/>
-              <a:t>Leaving out optional arguments to commands</a:t>
-            </a:r>
-          </a:p>
-          <a:p>
-            <a:r>
-              <a:rPr lang="en-US" dirty="0" smtClean="0"/>
-              <a:t>Lacking an understanding of the workflow</a:t>
+              <a:t>We’ll focus on the most important 10% of Git</a:t>
+            </a:r>
+          </a:p>
+          <a:p>
+            <a:r>
+              <a:rPr lang="en-US" dirty="0" smtClean="0"/>
+              <a:t>Being slow to learn Git will not hold you back in the rest of the course</a:t>
+            </a:r>
+          </a:p>
+          <a:p>
+            <a:r>
+              <a:rPr lang="en-US" dirty="0" smtClean="0"/>
+              <a:t>We can help you to troubleshoot</a:t>
+            </a:r>
+          </a:p>
+          <a:p>
+            <a:r>
+              <a:rPr lang="en-US" dirty="0" smtClean="0"/>
+              <a:t>We’re all in this together!</a:t>
             </a:r>
             <a:endParaRPr lang="en-US" dirty="0"/>
           </a:p>
@@ -6267,7 +6581,7 @@
     </p:spTree>
     <p:extLst>
       <p:ext uri="{BB962C8B-B14F-4D97-AF65-F5344CB8AC3E}">
-        <p14:creationId xmlns:p14="http://schemas.microsoft.com/office/powerpoint/2010/main" val="2243169695"/>
+        <p14:creationId xmlns:p14="http://schemas.microsoft.com/office/powerpoint/2010/main" val="2193089497"/>
       </p:ext>
     </p:extLst>
   </p:cSld>
@@ -6318,7 +6632,7 @@
           <a:p>
             <a:r>
               <a:rPr lang="en-US" dirty="0" smtClean="0"/>
-              <a:t>Don’t sweat it!</a:t>
+              <a:t>Installation</a:t>
             </a:r>
             <a:endParaRPr lang="en-US" dirty="0"/>
           </a:p>
@@ -6336,45 +6650,90 @@
         </p:nvSpPr>
         <p:spPr/>
         <p:txBody>
-          <a:bodyPr/>
-          <a:lstStyle/>
-          <a:p>
-            <a:r>
-              <a:rPr lang="en-US" dirty="0" smtClean="0"/>
-              <a:t>We’re going to focus on the most important 10% of Git</a:t>
-            </a:r>
-          </a:p>
-          <a:p>
-            <a:r>
-              <a:rPr lang="en-US" dirty="0" smtClean="0"/>
-              <a:t>You’re going to be doing the same tasks over and over</a:t>
-            </a:r>
-          </a:p>
-          <a:p>
-            <a:r>
-              <a:rPr lang="en-US" dirty="0" smtClean="0"/>
-              <a:t>Being slow to learn Git will not hold you back in the rest of the course</a:t>
-            </a:r>
-          </a:p>
-          <a:p>
-            <a:r>
-              <a:rPr lang="en-US" dirty="0" smtClean="0"/>
-              <a:t>We can help you to troubleshoot</a:t>
-            </a:r>
-          </a:p>
-          <a:p>
-            <a:r>
-              <a:rPr lang="en-US" dirty="0" smtClean="0"/>
-              <a:t>We’re all in this together!</a:t>
-            </a:r>
-            <a:endParaRPr lang="en-US" dirty="0"/>
+          <a:bodyPr>
+            <a:normAutofit/>
+          </a:bodyPr>
+          <a:lstStyle/>
+          <a:p>
+            <a:r>
+              <a:rPr lang="en-US" dirty="0" smtClean="0"/>
+              <a:t>GitHub:</a:t>
+            </a:r>
+          </a:p>
+          <a:p>
+            <a:pPr lvl="1"/>
+            <a:r>
+              <a:rPr lang="en-US" dirty="0" smtClean="0"/>
+              <a:t>Create an account at </a:t>
+            </a:r>
+            <a:r>
+              <a:rPr lang="en-US" dirty="0" smtClean="0">
+                <a:hlinkClick r:id="rId2"/>
+              </a:rPr>
+              <a:t>github.com</a:t>
+            </a:r>
+            <a:endParaRPr lang="en-US" dirty="0" smtClean="0"/>
+          </a:p>
+          <a:p>
+            <a:pPr lvl="1"/>
+            <a:r>
+              <a:rPr lang="en-US" dirty="0" smtClean="0"/>
+              <a:t>There’s nothing to install</a:t>
+            </a:r>
+          </a:p>
+          <a:p>
+            <a:pPr lvl="1"/>
+            <a:r>
+              <a:rPr lang="en-US" dirty="0" smtClean="0"/>
+              <a:t>Note: “GitHub </a:t>
+            </a:r>
+            <a:r>
+              <a:rPr lang="en-US" dirty="0"/>
+              <a:t>for Windows” </a:t>
+            </a:r>
+            <a:r>
+              <a:rPr lang="en-US" dirty="0" smtClean="0"/>
+              <a:t>&amp; </a:t>
+            </a:r>
+            <a:r>
+              <a:rPr lang="en-US" dirty="0"/>
+              <a:t>“GitHub for Mac” are GUI clients (alternatives to command line)</a:t>
+            </a:r>
+            <a:endParaRPr lang="en-US" dirty="0" smtClean="0"/>
+          </a:p>
+          <a:p>
+            <a:r>
+              <a:rPr lang="en-US" dirty="0" smtClean="0"/>
+              <a:t>Git:</a:t>
+            </a:r>
+          </a:p>
+          <a:p>
+            <a:pPr lvl="1"/>
+            <a:r>
+              <a:rPr lang="en-US" dirty="0"/>
+              <a:t>Download from </a:t>
+            </a:r>
+            <a:r>
+              <a:rPr lang="en-US" dirty="0" smtClean="0">
+                <a:hlinkClick r:id="rId3"/>
+              </a:rPr>
+              <a:t>git-scm.com/downloads</a:t>
+            </a:r>
+            <a:endParaRPr lang="en-US" dirty="0" smtClean="0"/>
+          </a:p>
+          <a:p>
+            <a:pPr lvl="1"/>
+            <a:r>
+              <a:rPr lang="en-US" dirty="0" smtClean="0"/>
+              <a:t>Install</a:t>
+            </a:r>
           </a:p>
         </p:txBody>
       </p:sp>
     </p:spTree>
     <p:extLst>
       <p:ext uri="{BB962C8B-B14F-4D97-AF65-F5344CB8AC3E}">
-        <p14:creationId xmlns:p14="http://schemas.microsoft.com/office/powerpoint/2010/main" val="2193089497"/>
+        <p14:creationId xmlns:p14="http://schemas.microsoft.com/office/powerpoint/2010/main" val="3560660682"/>
       </p:ext>
     </p:extLst>
   </p:cSld>
@@ -6425,7 +6784,7 @@
           <a:p>
             <a:r>
               <a:rPr lang="en-US" dirty="0" smtClean="0"/>
-              <a:t>Installation</a:t>
+              <a:t>Setup</a:t>
             </a:r>
             <a:endParaRPr lang="en-US" dirty="0"/>
           </a:p>
@@ -6443,27 +6802,116 @@
         </p:nvSpPr>
         <p:spPr/>
         <p:txBody>
-          <a:bodyPr>
-            <a:normAutofit/>
-          </a:bodyPr>
-          <a:lstStyle/>
-          <a:p>
-            <a:r>
-              <a:rPr lang="en-US" dirty="0" smtClean="0"/>
-              <a:t>GitHub:</a:t>
-            </a:r>
-          </a:p>
-          <a:p>
-            <a:pPr lvl="1"/>
-            <a:r>
-              <a:rPr lang="en-US" dirty="0" smtClean="0"/>
-              <a:t>Create an account at </a:t>
+          <a:bodyPr/>
+          <a:lstStyle/>
+          <a:p>
+            <a:r>
+              <a:rPr lang="en-US" dirty="0" smtClean="0"/>
+              <a:t>Open </a:t>
+            </a:r>
+            <a:r>
+              <a:rPr lang="en-US" dirty="0"/>
+              <a:t>Git Bash (Windows) or Terminal (Mac/Linux</a:t>
+            </a:r>
+            <a:r>
+              <a:rPr lang="en-US" dirty="0" smtClean="0"/>
+              <a:t>):</a:t>
+            </a:r>
+            <a:endParaRPr lang="en-US" dirty="0"/>
+          </a:p>
+          <a:p>
+            <a:pPr lvl="1"/>
+            <a:r>
+              <a:rPr lang="en-US" dirty="0" smtClean="0"/>
+              <a:t> </a:t>
+            </a:r>
+            <a:r>
+              <a:rPr lang="en-US" dirty="0" smtClean="0">
+                <a:solidFill>
+                  <a:srgbClr val="C00000"/>
+                </a:solidFill>
+              </a:rPr>
+              <a:t>git </a:t>
+            </a:r>
+            <a:r>
+              <a:rPr lang="en-US" dirty="0">
+                <a:solidFill>
+                  <a:srgbClr val="C00000"/>
+                </a:solidFill>
+              </a:rPr>
+              <a:t>config --global user.name “YOUR </a:t>
+            </a:r>
+            <a:r>
+              <a:rPr lang="en-US" dirty="0" smtClean="0">
+                <a:solidFill>
+                  <a:srgbClr val="C00000"/>
+                </a:solidFill>
+              </a:rPr>
+              <a:t>FULL NAME”</a:t>
+            </a:r>
+            <a:endParaRPr lang="en-US" dirty="0">
+              <a:solidFill>
+                <a:srgbClr val="C00000"/>
+              </a:solidFill>
+            </a:endParaRPr>
+          </a:p>
+          <a:p>
+            <a:pPr lvl="1"/>
+            <a:r>
+              <a:rPr lang="en-US" dirty="0" smtClean="0"/>
+              <a:t> </a:t>
+            </a:r>
+            <a:r>
+              <a:rPr lang="en-US" dirty="0" smtClean="0">
+                <a:solidFill>
+                  <a:srgbClr val="C00000"/>
+                </a:solidFill>
+              </a:rPr>
+              <a:t>git </a:t>
+            </a:r>
+            <a:r>
+              <a:rPr lang="en-US" dirty="0">
+                <a:solidFill>
+                  <a:srgbClr val="C00000"/>
+                </a:solidFill>
+              </a:rPr>
+              <a:t>config --global user.email “YOUR EMAIL</a:t>
+            </a:r>
+            <a:r>
+              <a:rPr lang="en-US" dirty="0" smtClean="0">
+                <a:solidFill>
+                  <a:srgbClr val="C00000"/>
+                </a:solidFill>
+              </a:rPr>
+              <a:t>”</a:t>
+            </a:r>
+          </a:p>
+          <a:p>
+            <a:r>
+              <a:rPr lang="en-US" dirty="0" smtClean="0"/>
+              <a:t>Use the same email address you used with your GitHub account</a:t>
+            </a:r>
+          </a:p>
+          <a:p>
+            <a:r>
+              <a:rPr lang="en-US" dirty="0" smtClean="0"/>
+              <a:t>Generate </a:t>
+            </a:r>
+            <a:r>
+              <a:rPr lang="en-US" dirty="0"/>
+              <a:t>SSH keys: </a:t>
             </a:r>
             <a:r>
               <a:rPr lang="en-US" dirty="0" smtClean="0">
                 <a:hlinkClick r:id="rId2"/>
               </a:rPr>
-              <a:t>github.com</a:t>
+              <a:t>tiny.cc/</a:t>
+            </a:r>
+            <a:r>
+              <a:rPr lang="en-US" dirty="0" err="1" smtClean="0">
+                <a:hlinkClick r:id="rId2"/>
+              </a:rPr>
+              <a:t>gitssh</a:t>
             </a:r>
             <a:endParaRPr lang="en-US" dirty="0" smtClean="0"/>
           </a:p>
@@ -6471,54 +6919,7 @@
             <a:pPr lvl="1"/>
             <a:r>
               <a:rPr lang="en-US" dirty="0" smtClean="0"/>
-              <a:t>There’s nothing to install</a:t>
-            </a:r>
-          </a:p>
-          <a:p>
-            <a:pPr lvl="1"/>
-            <a:r>
-              <a:rPr lang="en-US" dirty="0" smtClean="0"/>
-              <a:t>Note: “GitHub </a:t>
-            </a:r>
-            <a:r>
-              <a:rPr lang="en-US" dirty="0"/>
-              <a:t>for Windows” </a:t>
-            </a:r>
-            <a:r>
-              <a:rPr lang="en-US" dirty="0" smtClean="0"/>
-              <a:t>&amp; </a:t>
-            </a:r>
-            <a:r>
-              <a:rPr lang="en-US" dirty="0"/>
-              <a:t>“GitHub for Mac” are GUI clients (alternatives to command line)</a:t>
-            </a:r>
-            <a:endParaRPr lang="en-US" dirty="0" smtClean="0"/>
-          </a:p>
-          <a:p>
-            <a:r>
-              <a:rPr lang="en-US" dirty="0" smtClean="0"/>
-              <a:t>Git:</a:t>
-            </a:r>
-          </a:p>
-          <a:p>
-            <a:pPr lvl="1"/>
-            <a:r>
-              <a:rPr lang="en-US" dirty="0"/>
-              <a:t>Download from </a:t>
-            </a:r>
-            <a:r>
-              <a:rPr lang="en-US" dirty="0" smtClean="0">
-                <a:hlinkClick r:id="rId3"/>
-              </a:rPr>
-              <a:t>git-scm.com/downloads</a:t>
-            </a:r>
-            <a:endParaRPr lang="en-US" dirty="0" smtClean="0"/>
-          </a:p>
-          <a:p>
-            <a:pPr lvl="1"/>
-            <a:r>
-              <a:rPr lang="en-US" dirty="0" smtClean="0"/>
-              <a:t>Install</a:t>
+              <a:t>Not required, but more secure that HTTPS</a:t>
             </a:r>
           </a:p>
         </p:txBody>
@@ -6526,7 +6927,7 @@
     </p:spTree>
     <p:extLst>
       <p:ext uri="{BB962C8B-B14F-4D97-AF65-F5344CB8AC3E}">
-        <p14:creationId xmlns:p14="http://schemas.microsoft.com/office/powerpoint/2010/main" val="3560660682"/>
+        <p14:creationId xmlns:p14="http://schemas.microsoft.com/office/powerpoint/2010/main" val="4097134233"/>
       </p:ext>
     </p:extLst>
   </p:cSld>

</xml_diff>